<commit_message>
added variable selection slide
</commit_message>
<xml_diff>
--- a/screen_cast/Screen_cast.pptx
+++ b/screen_cast/Screen_cast.pptx
@@ -340,7 +340,7 @@
           <a:p>
             <a:fld id="{9D1F6957-B4EE-44CB-AAB0-2C4E61E2468B}" type="datetimeFigureOut">
               <a:rPr lang="en-US" smtClean="0"/>
-              <a:t>5/8/2015</a:t>
+              <a:t>5/9/15</a:t>
             </a:fld>
             <a:endParaRPr lang="en-US"/>
           </a:p>
@@ -548,7 +548,7 @@
           <a:p>
             <a:fld id="{9D1F6957-B4EE-44CB-AAB0-2C4E61E2468B}" type="datetimeFigureOut">
               <a:rPr lang="en-US" smtClean="0"/>
-              <a:t>5/8/2015</a:t>
+              <a:t>5/9/15</a:t>
             </a:fld>
             <a:endParaRPr lang="en-US"/>
           </a:p>
@@ -804,7 +804,7 @@
           <a:p>
             <a:fld id="{9D1F6957-B4EE-44CB-AAB0-2C4E61E2468B}" type="datetimeFigureOut">
               <a:rPr lang="en-US" smtClean="0"/>
-              <a:t>5/8/2015</a:t>
+              <a:t>5/9/15</a:t>
             </a:fld>
             <a:endParaRPr lang="en-US"/>
           </a:p>
@@ -974,7 +974,7 @@
           <a:p>
             <a:fld id="{9D1F6957-B4EE-44CB-AAB0-2C4E61E2468B}" type="datetimeFigureOut">
               <a:rPr lang="en-US" smtClean="0"/>
-              <a:t>5/8/2015</a:t>
+              <a:t>5/9/15</a:t>
             </a:fld>
             <a:endParaRPr lang="en-US"/>
           </a:p>
@@ -1317,7 +1317,7 @@
           <a:p>
             <a:fld id="{9D1F6957-B4EE-44CB-AAB0-2C4E61E2468B}" type="datetimeFigureOut">
               <a:rPr lang="en-US" smtClean="0"/>
-              <a:t>5/8/2015</a:t>
+              <a:t>5/9/15</a:t>
             </a:fld>
             <a:endParaRPr lang="en-US"/>
           </a:p>
@@ -1592,7 +1592,7 @@
           <a:p>
             <a:fld id="{9D1F6957-B4EE-44CB-AAB0-2C4E61E2468B}" type="datetimeFigureOut">
               <a:rPr lang="en-US" smtClean="0"/>
-              <a:t>5/8/2015</a:t>
+              <a:t>5/9/15</a:t>
             </a:fld>
             <a:endParaRPr lang="en-US"/>
           </a:p>
@@ -1971,7 +1971,7 @@
           <a:p>
             <a:fld id="{9D1F6957-B4EE-44CB-AAB0-2C4E61E2468B}" type="datetimeFigureOut">
               <a:rPr lang="en-US" smtClean="0"/>
-              <a:t>5/8/2015</a:t>
+              <a:t>5/9/15</a:t>
             </a:fld>
             <a:endParaRPr lang="en-US"/>
           </a:p>
@@ -2089,7 +2089,7 @@
           <a:p>
             <a:fld id="{9D1F6957-B4EE-44CB-AAB0-2C4E61E2468B}" type="datetimeFigureOut">
               <a:rPr lang="en-US" smtClean="0"/>
-              <a:t>5/8/2015</a:t>
+              <a:t>5/9/15</a:t>
             </a:fld>
             <a:endParaRPr lang="en-US"/>
           </a:p>
@@ -2260,7 +2260,7 @@
           <a:p>
             <a:fld id="{9D1F6957-B4EE-44CB-AAB0-2C4E61E2468B}" type="datetimeFigureOut">
               <a:rPr lang="en-US" smtClean="0"/>
-              <a:t>5/8/2015</a:t>
+              <a:t>5/9/15</a:t>
             </a:fld>
             <a:endParaRPr lang="en-US"/>
           </a:p>
@@ -2614,7 +2614,7 @@
           <a:p>
             <a:fld id="{9D1F6957-B4EE-44CB-AAB0-2C4E61E2468B}" type="datetimeFigureOut">
               <a:rPr lang="en-US" smtClean="0"/>
-              <a:t>5/8/2015</a:t>
+              <a:t>5/9/15</a:t>
             </a:fld>
             <a:endParaRPr lang="en-US"/>
           </a:p>
@@ -2991,7 +2991,7 @@
           <a:p>
             <a:fld id="{9D1F6957-B4EE-44CB-AAB0-2C4E61E2468B}" type="datetimeFigureOut">
               <a:rPr lang="en-US" smtClean="0"/>
-              <a:t>5/8/2015</a:t>
+              <a:t>5/9/15</a:t>
             </a:fld>
             <a:endParaRPr lang="en-US"/>
           </a:p>
@@ -3278,7 +3278,7 @@
           <a:p>
             <a:fld id="{9D1F6957-B4EE-44CB-AAB0-2C4E61E2468B}" type="datetimeFigureOut">
               <a:rPr lang="en-US" smtClean="0"/>
-              <a:t>5/8/2015</a:t>
+              <a:t>5/9/15</a:t>
             </a:fld>
             <a:endParaRPr lang="en-US"/>
           </a:p>
@@ -3872,7 +3872,7 @@
   <p:timing>
     <p:tnLst>
       <p:par>
-        <p:cTn id="1" dur="indefinite" restart="never" nodeType="tmRoot"/>
+        <p:cTn xmlns:p14="http://schemas.microsoft.com/office/powerpoint/2010/main" id="1" dur="indefinite" restart="never" nodeType="tmRoot"/>
       </p:par>
     </p:tnLst>
   </p:timing>
@@ -3951,7 +3951,7 @@
   <p:timing>
     <p:tnLst>
       <p:par>
-        <p:cTn id="1" dur="indefinite" restart="never" nodeType="tmRoot"/>
+        <p:cTn xmlns:p14="http://schemas.microsoft.com/office/powerpoint/2010/main" id="1" dur="indefinite" restart="never" nodeType="tmRoot"/>
       </p:par>
     </p:tnLst>
   </p:timing>
@@ -4030,7 +4030,7 @@
   <p:timing>
     <p:tnLst>
       <p:par>
-        <p:cTn id="1" dur="indefinite" restart="never" nodeType="tmRoot"/>
+        <p:cTn xmlns:p14="http://schemas.microsoft.com/office/powerpoint/2010/main" id="1" dur="indefinite" restart="never" nodeType="tmRoot"/>
       </p:par>
     </p:tnLst>
   </p:timing>
@@ -4092,10 +4092,136 @@
           <a:bodyPr/>
           <a:lstStyle/>
           <a:p>
-            <a:endParaRPr lang="en-US"/>
-          </a:p>
-        </p:txBody>
-      </p:sp>
+            <a:pPr marL="457200" indent="-457200">
+              <a:buFont typeface="+mj-lt"/>
+              <a:buAutoNum type="arabicPeriod"/>
+            </a:pPr>
+            <a:r>
+              <a:rPr lang="en-US" dirty="0" smtClean="0"/>
+              <a:t>Ranked predictors by relative importance </a:t>
+            </a:r>
+            <a:r>
+              <a:rPr lang="en-US" dirty="0" smtClean="0"/>
+              <a:t>from </a:t>
+            </a:r>
+            <a:r>
+              <a:rPr lang="en-US" dirty="0" smtClean="0"/>
+              <a:t>random forest</a:t>
+            </a:r>
+          </a:p>
+          <a:p>
+            <a:pPr marL="457200" indent="-457200">
+              <a:buFont typeface="+mj-lt"/>
+              <a:buAutoNum type="arabicPeriod"/>
+            </a:pPr>
+            <a:r>
+              <a:rPr lang="en-US" dirty="0" smtClean="0"/>
+              <a:t>Iterated over the </a:t>
+            </a:r>
+            <a:r>
+              <a:rPr lang="en-US" i="1" dirty="0" smtClean="0"/>
+              <a:t>N</a:t>
+            </a:r>
+            <a:r>
+              <a:rPr lang="en-US" dirty="0" smtClean="0"/>
+              <a:t> most important predictors </a:t>
+            </a:r>
+            <a:r>
+              <a:rPr lang="en-US" dirty="0" smtClean="0"/>
+              <a:t>and compared</a:t>
+            </a:r>
+            <a:r>
+              <a:rPr lang="en-US" dirty="0" smtClean="0"/>
+              <a:t> </a:t>
+            </a:r>
+            <a:r>
+              <a:rPr lang="en-US" dirty="0" smtClean="0"/>
+              <a:t>10-fold cross </a:t>
+            </a:r>
+            <a:r>
+              <a:rPr lang="en-US" dirty="0" smtClean="0"/>
+              <a:t>validation scores</a:t>
+            </a:r>
+            <a:endParaRPr lang="en-US" dirty="0" smtClean="0"/>
+          </a:p>
+          <a:p>
+            <a:pPr marL="457200" indent="-457200">
+              <a:buFont typeface="+mj-lt"/>
+              <a:buAutoNum type="arabicPeriod"/>
+            </a:pPr>
+            <a:r>
+              <a:rPr lang="en-US" dirty="0" smtClean="0"/>
+              <a:t>Selected the 5 most important predictors for the final model</a:t>
+            </a:r>
+          </a:p>
+          <a:p>
+            <a:pPr marL="0" indent="0">
+              <a:buNone/>
+            </a:pPr>
+            <a:endParaRPr lang="en-US" dirty="0"/>
+          </a:p>
+        </p:txBody>
+      </p:sp>
+      <p:pic>
+        <p:nvPicPr>
+          <p:cNvPr id="4" name="Picture 3" descr="RF Importance.png"/>
+          <p:cNvPicPr>
+            <a:picLocks noChangeAspect="1"/>
+          </p:cNvPicPr>
+          <p:nvPr/>
+        </p:nvPicPr>
+        <p:blipFill>
+          <a:blip r:embed="rId2">
+            <a:extLst>
+              <a:ext uri="{28A0092B-C50C-407E-A947-70E740481C1C}">
+                <a14:useLocalDpi xmlns:a14="http://schemas.microsoft.com/office/drawing/2010/main" val="0"/>
+              </a:ext>
+            </a:extLst>
+          </a:blip>
+          <a:stretch>
+            <a:fillRect/>
+          </a:stretch>
+        </p:blipFill>
+        <p:spPr>
+          <a:xfrm>
+            <a:off x="1092200" y="3340100"/>
+            <a:ext cx="4389120" cy="2926080"/>
+          </a:xfrm>
+          <a:prstGeom prst="rect">
+            <a:avLst/>
+          </a:prstGeom>
+        </p:spPr>
+      </p:pic>
+      <p:pic>
+        <p:nvPicPr>
+          <p:cNvPr id="5" name="Picture 4"/>
+          <p:cNvPicPr>
+            <a:picLocks noChangeAspect="1"/>
+          </p:cNvPicPr>
+          <p:nvPr/>
+        </p:nvPicPr>
+        <p:blipFill>
+          <a:blip r:embed="rId3">
+            <a:extLst>
+              <a:ext uri="{28A0092B-C50C-407E-A947-70E740481C1C}">
+                <a14:useLocalDpi xmlns:a14="http://schemas.microsoft.com/office/drawing/2010/main" val="0"/>
+              </a:ext>
+            </a:extLst>
+          </a:blip>
+          <a:stretch>
+            <a:fillRect/>
+          </a:stretch>
+        </p:blipFill>
+        <p:spPr>
+          <a:xfrm>
+            <a:off x="6235700" y="3340100"/>
+            <a:ext cx="4389120" cy="2926080"/>
+          </a:xfrm>
+          <a:prstGeom prst="rect">
+            <a:avLst/>
+          </a:prstGeom>
+        </p:spPr>
+      </p:pic>
     </p:spTree>
     <p:extLst>
       <p:ext uri="{BB962C8B-B14F-4D97-AF65-F5344CB8AC3E}">
@@ -4109,7 +4235,7 @@
   <p:timing>
     <p:tnLst>
       <p:par>
-        <p:cTn id="1" dur="indefinite" restart="never" nodeType="tmRoot"/>
+        <p:cTn xmlns:p14="http://schemas.microsoft.com/office/powerpoint/2010/main" id="1" dur="indefinite" restart="never" nodeType="tmRoot"/>
       </p:par>
     </p:tnLst>
   </p:timing>
@@ -4334,7 +4460,7 @@
   <p:timing>
     <p:tnLst>
       <p:par>
-        <p:cTn id="1" dur="indefinite" restart="never" nodeType="tmRoot"/>
+        <p:cTn xmlns:p14="http://schemas.microsoft.com/office/powerpoint/2010/main" id="1" dur="indefinite" restart="never" nodeType="tmRoot"/>
       </p:par>
     </p:tnLst>
   </p:timing>
@@ -5417,7 +5543,7 @@
   <p:timing>
     <p:tnLst>
       <p:par>
-        <p:cTn id="1" dur="indefinite" restart="never" nodeType="tmRoot"/>
+        <p:cTn xmlns:p14="http://schemas.microsoft.com/office/powerpoint/2010/main" id="1" dur="indefinite" restart="never" nodeType="tmRoot"/>
       </p:par>
     </p:tnLst>
   </p:timing>
@@ -6215,7 +6341,7 @@
   <p:timing>
     <p:tnLst>
       <p:par>
-        <p:cTn id="1" dur="indefinite" restart="never" nodeType="tmRoot"/>
+        <p:cTn xmlns:p14="http://schemas.microsoft.com/office/powerpoint/2010/main" id="1" dur="indefinite" restart="never" nodeType="tmRoot"/>
       </p:par>
     </p:tnLst>
   </p:timing>
@@ -6294,7 +6420,7 @@
   <p:timing>
     <p:tnLst>
       <p:par>
-        <p:cTn id="1" dur="indefinite" restart="never" nodeType="tmRoot"/>
+        <p:cTn xmlns:p14="http://schemas.microsoft.com/office/powerpoint/2010/main" id="1" dur="indefinite" restart="never" nodeType="tmRoot"/>
       </p:par>
     </p:tnLst>
   </p:timing>
@@ -6344,7 +6470,7 @@
     </a:clrScheme>
     <a:fontScheme name="Retrospect">
       <a:majorFont>
-        <a:latin typeface="Calibri Light" panose="020F0302020204030204"/>
+        <a:latin typeface="Calibri Light"/>
         <a:ea typeface=""/>
         <a:cs typeface=""/>
         <a:font script="Jpan" typeface="ＭＳ Ｐゴシック"/>
@@ -6379,7 +6505,7 @@
         <a:font script="Geor" typeface="Sylfaen"/>
       </a:majorFont>
       <a:minorFont>
-        <a:latin typeface="Calibri" panose="020F0502020204030204"/>
+        <a:latin typeface="Calibri"/>
         <a:ea typeface=""/>
         <a:cs typeface=""/>
         <a:font script="Jpan" typeface="ＭＳ Ｐゴシック"/>
@@ -6578,7 +6704,7 @@
   <a:extraClrSchemeLst/>
   <a:extLst>
     <a:ext uri="{05A4C25C-085E-4340-85A3-A5531E510DB2}">
-      <thm15:themeFamily xmlns:thm15="http://schemas.microsoft.com/office/thememl/2012/main" name="Retrospect" id="{5F128B03-DCCA-4EEB-AB3B-CF2899314A46}" vid="{9CC26709-368C-4D72-9060-94E5B3FF3CD6}"/>
+      <thm15:themeFamily xmlns="" xmlns:thm15="http://schemas.microsoft.com/office/thememl/2012/main" name="Retrospect" id="{5F128B03-DCCA-4EEB-AB3B-CF2899314A46}" vid="{9CC26709-368C-4D72-9060-94E5B3FF3CD6}"/>
     </a:ext>
   </a:extLst>
 </a:theme>

</xml_diff>

<commit_message>
Added screencast notes to presentation
</commit_message>
<xml_diff>
--- a/screen_cast/Screen_cast.pptx
+++ b/screen_cast/Screen_cast.pptx
@@ -4,6 +4,9 @@
   <p:sldMasterIdLst>
     <p:sldMasterId id="2147483720" r:id="rId1"/>
   </p:sldMasterIdLst>
+  <p:notesMasterIdLst>
+    <p:notesMasterId r:id="rId12"/>
+  </p:notesMasterIdLst>
   <p:sldIdLst>
     <p:sldId id="256" r:id="rId2"/>
     <p:sldId id="261" r:id="rId3"/>
@@ -114,6 +117,1372 @@
     </a:lvl9pPr>
   </p:defaultTextStyle>
 </p:presentation>
+</file>
+
+<file path=ppt/notesMasters/notesMaster1.xml><?xml version="1.0" encoding="utf-8"?>
+<p:notesMaster xmlns:a="http://schemas.openxmlformats.org/drawingml/2006/main" xmlns:r="http://schemas.openxmlformats.org/officeDocument/2006/relationships" xmlns:p="http://schemas.openxmlformats.org/presentationml/2006/main">
+  <p:cSld>
+    <p:bg>
+      <p:bgRef idx="1001">
+        <a:schemeClr val="bg1"/>
+      </p:bgRef>
+    </p:bg>
+    <p:spTree>
+      <p:nvGrpSpPr>
+        <p:cNvPr id="1" name=""/>
+        <p:cNvGrpSpPr/>
+        <p:nvPr/>
+      </p:nvGrpSpPr>
+      <p:grpSpPr>
+        <a:xfrm>
+          <a:off x="0" y="0"/>
+          <a:ext cx="0" cy="0"/>
+          <a:chOff x="0" y="0"/>
+          <a:chExt cx="0" cy="0"/>
+        </a:xfrm>
+      </p:grpSpPr>
+      <p:sp>
+        <p:nvSpPr>
+          <p:cNvPr id="2" name="Header Placeholder 1"/>
+          <p:cNvSpPr>
+            <a:spLocks noGrp="1"/>
+          </p:cNvSpPr>
+          <p:nvPr>
+            <p:ph type="hdr" sz="quarter"/>
+          </p:nvPr>
+        </p:nvSpPr>
+        <p:spPr>
+          <a:xfrm>
+            <a:off x="0" y="0"/>
+            <a:ext cx="2971800" cy="457200"/>
+          </a:xfrm>
+          <a:prstGeom prst="rect">
+            <a:avLst/>
+          </a:prstGeom>
+        </p:spPr>
+        <p:txBody>
+          <a:bodyPr vert="horz" lIns="91440" tIns="45720" rIns="91440" bIns="45720" rtlCol="0"/>
+          <a:lstStyle>
+            <a:lvl1pPr algn="l">
+              <a:defRPr sz="1200"/>
+            </a:lvl1pPr>
+          </a:lstStyle>
+          <a:p>
+            <a:endParaRPr lang="en-US"/>
+          </a:p>
+        </p:txBody>
+      </p:sp>
+      <p:sp>
+        <p:nvSpPr>
+          <p:cNvPr id="3" name="Date Placeholder 2"/>
+          <p:cNvSpPr>
+            <a:spLocks noGrp="1"/>
+          </p:cNvSpPr>
+          <p:nvPr>
+            <p:ph type="dt" idx="1"/>
+          </p:nvPr>
+        </p:nvSpPr>
+        <p:spPr>
+          <a:xfrm>
+            <a:off x="3884613" y="0"/>
+            <a:ext cx="2971800" cy="457200"/>
+          </a:xfrm>
+          <a:prstGeom prst="rect">
+            <a:avLst/>
+          </a:prstGeom>
+        </p:spPr>
+        <p:txBody>
+          <a:bodyPr vert="horz" lIns="91440" tIns="45720" rIns="91440" bIns="45720" rtlCol="0"/>
+          <a:lstStyle>
+            <a:lvl1pPr algn="r">
+              <a:defRPr sz="1200"/>
+            </a:lvl1pPr>
+          </a:lstStyle>
+          <a:p>
+            <a:fld id="{E9613AA6-7A0C-F945-857C-1DF5D2CBB90B}" type="datetimeFigureOut">
+              <a:rPr lang="en-US" smtClean="0"/>
+              <a:t>5/11/15</a:t>
+            </a:fld>
+            <a:endParaRPr lang="en-US"/>
+          </a:p>
+        </p:txBody>
+      </p:sp>
+      <p:sp>
+        <p:nvSpPr>
+          <p:cNvPr id="4" name="Slide Image Placeholder 3"/>
+          <p:cNvSpPr>
+            <a:spLocks noGrp="1" noRot="1" noChangeAspect="1"/>
+          </p:cNvSpPr>
+          <p:nvPr>
+            <p:ph type="sldImg" idx="2"/>
+          </p:nvPr>
+        </p:nvSpPr>
+        <p:spPr>
+          <a:xfrm>
+            <a:off x="381000" y="685800"/>
+            <a:ext cx="6096000" cy="3429000"/>
+          </a:xfrm>
+          <a:prstGeom prst="rect">
+            <a:avLst/>
+          </a:prstGeom>
+          <a:noFill/>
+          <a:ln w="12700">
+            <a:solidFill>
+              <a:prstClr val="black"/>
+            </a:solidFill>
+          </a:ln>
+        </p:spPr>
+        <p:txBody>
+          <a:bodyPr vert="horz" lIns="91440" tIns="45720" rIns="91440" bIns="45720" rtlCol="0" anchor="ctr"/>
+          <a:lstStyle/>
+          <a:p>
+            <a:endParaRPr lang="en-US"/>
+          </a:p>
+        </p:txBody>
+      </p:sp>
+      <p:sp>
+        <p:nvSpPr>
+          <p:cNvPr id="5" name="Notes Placeholder 4"/>
+          <p:cNvSpPr>
+            <a:spLocks noGrp="1"/>
+          </p:cNvSpPr>
+          <p:nvPr>
+            <p:ph type="body" sz="quarter" idx="3"/>
+          </p:nvPr>
+        </p:nvSpPr>
+        <p:spPr>
+          <a:xfrm>
+            <a:off x="685800" y="4343400"/>
+            <a:ext cx="5486400" cy="4114800"/>
+          </a:xfrm>
+          <a:prstGeom prst="rect">
+            <a:avLst/>
+          </a:prstGeom>
+        </p:spPr>
+        <p:txBody>
+          <a:bodyPr vert="horz" lIns="91440" tIns="45720" rIns="91440" bIns="45720" rtlCol="0"/>
+          <a:lstStyle/>
+          <a:p>
+            <a:pPr lvl="0"/>
+            <a:r>
+              <a:rPr lang="en-US" smtClean="0"/>
+              <a:t>Click to edit Master text styles</a:t>
+            </a:r>
+          </a:p>
+          <a:p>
+            <a:pPr lvl="1"/>
+            <a:r>
+              <a:rPr lang="en-US" smtClean="0"/>
+              <a:t>Second level</a:t>
+            </a:r>
+          </a:p>
+          <a:p>
+            <a:pPr lvl="2"/>
+            <a:r>
+              <a:rPr lang="en-US" smtClean="0"/>
+              <a:t>Third level</a:t>
+            </a:r>
+          </a:p>
+          <a:p>
+            <a:pPr lvl="3"/>
+            <a:r>
+              <a:rPr lang="en-US" smtClean="0"/>
+              <a:t>Fourth level</a:t>
+            </a:r>
+          </a:p>
+          <a:p>
+            <a:pPr lvl="4"/>
+            <a:r>
+              <a:rPr lang="en-US" smtClean="0"/>
+              <a:t>Fifth level</a:t>
+            </a:r>
+            <a:endParaRPr lang="en-US"/>
+          </a:p>
+        </p:txBody>
+      </p:sp>
+      <p:sp>
+        <p:nvSpPr>
+          <p:cNvPr id="6" name="Footer Placeholder 5"/>
+          <p:cNvSpPr>
+            <a:spLocks noGrp="1"/>
+          </p:cNvSpPr>
+          <p:nvPr>
+            <p:ph type="ftr" sz="quarter" idx="4"/>
+          </p:nvPr>
+        </p:nvSpPr>
+        <p:spPr>
+          <a:xfrm>
+            <a:off x="0" y="8685213"/>
+            <a:ext cx="2971800" cy="457200"/>
+          </a:xfrm>
+          <a:prstGeom prst="rect">
+            <a:avLst/>
+          </a:prstGeom>
+        </p:spPr>
+        <p:txBody>
+          <a:bodyPr vert="horz" lIns="91440" tIns="45720" rIns="91440" bIns="45720" rtlCol="0" anchor="b"/>
+          <a:lstStyle>
+            <a:lvl1pPr algn="l">
+              <a:defRPr sz="1200"/>
+            </a:lvl1pPr>
+          </a:lstStyle>
+          <a:p>
+            <a:endParaRPr lang="en-US"/>
+          </a:p>
+        </p:txBody>
+      </p:sp>
+      <p:sp>
+        <p:nvSpPr>
+          <p:cNvPr id="7" name="Slide Number Placeholder 6"/>
+          <p:cNvSpPr>
+            <a:spLocks noGrp="1"/>
+          </p:cNvSpPr>
+          <p:nvPr>
+            <p:ph type="sldNum" sz="quarter" idx="5"/>
+          </p:nvPr>
+        </p:nvSpPr>
+        <p:spPr>
+          <a:xfrm>
+            <a:off x="3884613" y="8685213"/>
+            <a:ext cx="2971800" cy="457200"/>
+          </a:xfrm>
+          <a:prstGeom prst="rect">
+            <a:avLst/>
+          </a:prstGeom>
+        </p:spPr>
+        <p:txBody>
+          <a:bodyPr vert="horz" lIns="91440" tIns="45720" rIns="91440" bIns="45720" rtlCol="0" anchor="b"/>
+          <a:lstStyle>
+            <a:lvl1pPr algn="r">
+              <a:defRPr sz="1200"/>
+            </a:lvl1pPr>
+          </a:lstStyle>
+          <a:p>
+            <a:fld id="{C903A796-7CA2-BF49-9968-373C49633B76}" type="slidenum">
+              <a:rPr lang="en-US" smtClean="0"/>
+              <a:t>‹#›</a:t>
+            </a:fld>
+            <a:endParaRPr lang="en-US"/>
+          </a:p>
+        </p:txBody>
+      </p:sp>
+    </p:spTree>
+    <p:extLst>
+      <p:ext uri="{BB962C8B-B14F-4D97-AF65-F5344CB8AC3E}">
+        <p14:creationId xmlns:p14="http://schemas.microsoft.com/office/powerpoint/2010/main" val="3348778115"/>
+      </p:ext>
+    </p:extLst>
+  </p:cSld>
+  <p:clrMap bg1="lt1" tx1="dk1" bg2="lt2" tx2="dk2" accent1="accent1" accent2="accent2" accent3="accent3" accent4="accent4" accent5="accent5" accent6="accent6" hlink="hlink" folHlink="folHlink"/>
+  <p:notesStyle>
+    <a:lvl1pPr marL="0" algn="l" defTabSz="457200" rtl="0" eaLnBrk="1" latinLnBrk="0" hangingPunct="1">
+      <a:defRPr sz="1200" kern="1200">
+        <a:solidFill>
+          <a:schemeClr val="tx1"/>
+        </a:solidFill>
+        <a:latin typeface="+mn-lt"/>
+        <a:ea typeface="+mn-ea"/>
+        <a:cs typeface="+mn-cs"/>
+      </a:defRPr>
+    </a:lvl1pPr>
+    <a:lvl2pPr marL="457200" algn="l" defTabSz="457200" rtl="0" eaLnBrk="1" latinLnBrk="0" hangingPunct="1">
+      <a:defRPr sz="1200" kern="1200">
+        <a:solidFill>
+          <a:schemeClr val="tx1"/>
+        </a:solidFill>
+        <a:latin typeface="+mn-lt"/>
+        <a:ea typeface="+mn-ea"/>
+        <a:cs typeface="+mn-cs"/>
+      </a:defRPr>
+    </a:lvl2pPr>
+    <a:lvl3pPr marL="914400" algn="l" defTabSz="457200" rtl="0" eaLnBrk="1" latinLnBrk="0" hangingPunct="1">
+      <a:defRPr sz="1200" kern="1200">
+        <a:solidFill>
+          <a:schemeClr val="tx1"/>
+        </a:solidFill>
+        <a:latin typeface="+mn-lt"/>
+        <a:ea typeface="+mn-ea"/>
+        <a:cs typeface="+mn-cs"/>
+      </a:defRPr>
+    </a:lvl3pPr>
+    <a:lvl4pPr marL="1371600" algn="l" defTabSz="457200" rtl="0" eaLnBrk="1" latinLnBrk="0" hangingPunct="1">
+      <a:defRPr sz="1200" kern="1200">
+        <a:solidFill>
+          <a:schemeClr val="tx1"/>
+        </a:solidFill>
+        <a:latin typeface="+mn-lt"/>
+        <a:ea typeface="+mn-ea"/>
+        <a:cs typeface="+mn-cs"/>
+      </a:defRPr>
+    </a:lvl4pPr>
+    <a:lvl5pPr marL="1828800" algn="l" defTabSz="457200" rtl="0" eaLnBrk="1" latinLnBrk="0" hangingPunct="1">
+      <a:defRPr sz="1200" kern="1200">
+        <a:solidFill>
+          <a:schemeClr val="tx1"/>
+        </a:solidFill>
+        <a:latin typeface="+mn-lt"/>
+        <a:ea typeface="+mn-ea"/>
+        <a:cs typeface="+mn-cs"/>
+      </a:defRPr>
+    </a:lvl5pPr>
+    <a:lvl6pPr marL="2286000" algn="l" defTabSz="457200" rtl="0" eaLnBrk="1" latinLnBrk="0" hangingPunct="1">
+      <a:defRPr sz="1200" kern="1200">
+        <a:solidFill>
+          <a:schemeClr val="tx1"/>
+        </a:solidFill>
+        <a:latin typeface="+mn-lt"/>
+        <a:ea typeface="+mn-ea"/>
+        <a:cs typeface="+mn-cs"/>
+      </a:defRPr>
+    </a:lvl6pPr>
+    <a:lvl7pPr marL="2743200" algn="l" defTabSz="457200" rtl="0" eaLnBrk="1" latinLnBrk="0" hangingPunct="1">
+      <a:defRPr sz="1200" kern="1200">
+        <a:solidFill>
+          <a:schemeClr val="tx1"/>
+        </a:solidFill>
+        <a:latin typeface="+mn-lt"/>
+        <a:ea typeface="+mn-ea"/>
+        <a:cs typeface="+mn-cs"/>
+      </a:defRPr>
+    </a:lvl7pPr>
+    <a:lvl8pPr marL="3200400" algn="l" defTabSz="457200" rtl="0" eaLnBrk="1" latinLnBrk="0" hangingPunct="1">
+      <a:defRPr sz="1200" kern="1200">
+        <a:solidFill>
+          <a:schemeClr val="tx1"/>
+        </a:solidFill>
+        <a:latin typeface="+mn-lt"/>
+        <a:ea typeface="+mn-ea"/>
+        <a:cs typeface="+mn-cs"/>
+      </a:defRPr>
+    </a:lvl8pPr>
+    <a:lvl9pPr marL="3657600" algn="l" defTabSz="457200" rtl="0" eaLnBrk="1" latinLnBrk="0" hangingPunct="1">
+      <a:defRPr sz="1200" kern="1200">
+        <a:solidFill>
+          <a:schemeClr val="tx1"/>
+        </a:solidFill>
+        <a:latin typeface="+mn-lt"/>
+        <a:ea typeface="+mn-ea"/>
+        <a:cs typeface="+mn-cs"/>
+      </a:defRPr>
+    </a:lvl9pPr>
+  </p:notesStyle>
+</p:notesMaster>
+</file>
+
+<file path=ppt/notesSlides/notesSlide1.xml><?xml version="1.0" encoding="utf-8"?>
+<p:notes xmlns:a="http://schemas.openxmlformats.org/drawingml/2006/main" xmlns:r="http://schemas.openxmlformats.org/officeDocument/2006/relationships" xmlns:p="http://schemas.openxmlformats.org/presentationml/2006/main">
+  <p:cSld>
+    <p:spTree>
+      <p:nvGrpSpPr>
+        <p:cNvPr id="1" name=""/>
+        <p:cNvGrpSpPr/>
+        <p:nvPr/>
+      </p:nvGrpSpPr>
+      <p:grpSpPr>
+        <a:xfrm>
+          <a:off x="0" y="0"/>
+          <a:ext cx="0" cy="0"/>
+          <a:chOff x="0" y="0"/>
+          <a:chExt cx="0" cy="0"/>
+        </a:xfrm>
+      </p:grpSpPr>
+      <p:sp>
+        <p:nvSpPr>
+          <p:cNvPr id="2" name="Slide Image Placeholder 1"/>
+          <p:cNvSpPr>
+            <a:spLocks noGrp="1" noRot="1" noChangeAspect="1"/>
+          </p:cNvSpPr>
+          <p:nvPr>
+            <p:ph type="sldImg"/>
+          </p:nvPr>
+        </p:nvSpPr>
+        <p:spPr/>
+      </p:sp>
+      <p:sp>
+        <p:nvSpPr>
+          <p:cNvPr id="3" name="Notes Placeholder 2"/>
+          <p:cNvSpPr>
+            <a:spLocks noGrp="1"/>
+          </p:cNvSpPr>
+          <p:nvPr>
+            <p:ph type="body" idx="1"/>
+          </p:nvPr>
+        </p:nvSpPr>
+        <p:spPr/>
+        <p:txBody>
+          <a:bodyPr/>
+          <a:lstStyle/>
+          <a:p>
+            <a:endParaRPr lang="en-US" dirty="0" smtClean="0"/>
+          </a:p>
+        </p:txBody>
+      </p:sp>
+      <p:sp>
+        <p:nvSpPr>
+          <p:cNvPr id="4" name="Slide Number Placeholder 3"/>
+          <p:cNvSpPr>
+            <a:spLocks noGrp="1"/>
+          </p:cNvSpPr>
+          <p:nvPr>
+            <p:ph type="sldNum" sz="quarter" idx="10"/>
+          </p:nvPr>
+        </p:nvSpPr>
+        <p:spPr/>
+        <p:txBody>
+          <a:bodyPr/>
+          <a:lstStyle/>
+          <a:p>
+            <a:fld id="{C903A796-7CA2-BF49-9968-373C49633B76}" type="slidenum">
+              <a:rPr lang="en-US" smtClean="0"/>
+              <a:t>1</a:t>
+            </a:fld>
+            <a:endParaRPr lang="en-US"/>
+          </a:p>
+        </p:txBody>
+      </p:sp>
+    </p:spTree>
+    <p:extLst>
+      <p:ext uri="{BB962C8B-B14F-4D97-AF65-F5344CB8AC3E}">
+        <p14:creationId xmlns:p14="http://schemas.microsoft.com/office/powerpoint/2010/main" val="4209857967"/>
+      </p:ext>
+    </p:extLst>
+  </p:cSld>
+  <p:clrMapOvr>
+    <a:masterClrMapping/>
+  </p:clrMapOvr>
+</p:notes>
+</file>
+
+<file path=ppt/notesSlides/notesSlide10.xml><?xml version="1.0" encoding="utf-8"?>
+<p:notes xmlns:a="http://schemas.openxmlformats.org/drawingml/2006/main" xmlns:r="http://schemas.openxmlformats.org/officeDocument/2006/relationships" xmlns:p="http://schemas.openxmlformats.org/presentationml/2006/main">
+  <p:cSld>
+    <p:spTree>
+      <p:nvGrpSpPr>
+        <p:cNvPr id="1" name=""/>
+        <p:cNvGrpSpPr/>
+        <p:nvPr/>
+      </p:nvGrpSpPr>
+      <p:grpSpPr>
+        <a:xfrm>
+          <a:off x="0" y="0"/>
+          <a:ext cx="0" cy="0"/>
+          <a:chOff x="0" y="0"/>
+          <a:chExt cx="0" cy="0"/>
+        </a:xfrm>
+      </p:grpSpPr>
+      <p:sp>
+        <p:nvSpPr>
+          <p:cNvPr id="2" name="Slide Image Placeholder 1"/>
+          <p:cNvSpPr>
+            <a:spLocks noGrp="1" noRot="1" noChangeAspect="1"/>
+          </p:cNvSpPr>
+          <p:nvPr>
+            <p:ph type="sldImg"/>
+          </p:nvPr>
+        </p:nvSpPr>
+        <p:spPr/>
+      </p:sp>
+      <p:sp>
+        <p:nvSpPr>
+          <p:cNvPr id="3" name="Notes Placeholder 2"/>
+          <p:cNvSpPr>
+            <a:spLocks noGrp="1"/>
+          </p:cNvSpPr>
+          <p:nvPr>
+            <p:ph type="body" idx="1"/>
+          </p:nvPr>
+        </p:nvSpPr>
+        <p:spPr/>
+        <p:txBody>
+          <a:bodyPr/>
+          <a:lstStyle/>
+          <a:p>
+            <a:r>
+              <a:rPr lang="en-US" dirty="0" smtClean="0"/>
+              <a:t>Our Final Four simulations were a mixed bag. We ascribed moderate probability to the real life outcome, but did not predict it perfectly.</a:t>
+            </a:r>
+          </a:p>
+          <a:p>
+            <a:endParaRPr lang="en-US" dirty="0" smtClean="0"/>
+          </a:p>
+          <a:p>
+            <a:r>
+              <a:rPr lang="en-US" dirty="0" smtClean="0"/>
+              <a:t>But our accuracy and our simulation results indicate that ours is a powerful model for prediction.</a:t>
+            </a:r>
+          </a:p>
+          <a:p>
+            <a:endParaRPr lang="en-US" dirty="0" smtClean="0"/>
+          </a:p>
+          <a:p>
+            <a:r>
+              <a:rPr lang="en-US" dirty="0" smtClean="0"/>
+              <a:t>We look forward to putting it to the test again in next year’s tournament.</a:t>
+            </a:r>
+            <a:endParaRPr lang="en-US" dirty="0"/>
+          </a:p>
+        </p:txBody>
+      </p:sp>
+      <p:sp>
+        <p:nvSpPr>
+          <p:cNvPr id="4" name="Slide Number Placeholder 3"/>
+          <p:cNvSpPr>
+            <a:spLocks noGrp="1"/>
+          </p:cNvSpPr>
+          <p:nvPr>
+            <p:ph type="sldNum" sz="quarter" idx="10"/>
+          </p:nvPr>
+        </p:nvSpPr>
+        <p:spPr/>
+        <p:txBody>
+          <a:bodyPr/>
+          <a:lstStyle/>
+          <a:p>
+            <a:fld id="{C903A796-7CA2-BF49-9968-373C49633B76}" type="slidenum">
+              <a:rPr lang="en-US" smtClean="0"/>
+              <a:t>10</a:t>
+            </a:fld>
+            <a:endParaRPr lang="en-US"/>
+          </a:p>
+        </p:txBody>
+      </p:sp>
+    </p:spTree>
+    <p:extLst>
+      <p:ext uri="{BB962C8B-B14F-4D97-AF65-F5344CB8AC3E}">
+        <p14:creationId xmlns:p14="http://schemas.microsoft.com/office/powerpoint/2010/main" val="654627474"/>
+      </p:ext>
+    </p:extLst>
+  </p:cSld>
+  <p:clrMapOvr>
+    <a:masterClrMapping/>
+  </p:clrMapOvr>
+</p:notes>
+</file>
+
+<file path=ppt/notesSlides/notesSlide2.xml><?xml version="1.0" encoding="utf-8"?>
+<p:notes xmlns:a="http://schemas.openxmlformats.org/drawingml/2006/main" xmlns:r="http://schemas.openxmlformats.org/officeDocument/2006/relationships" xmlns:p="http://schemas.openxmlformats.org/presentationml/2006/main">
+  <p:cSld>
+    <p:spTree>
+      <p:nvGrpSpPr>
+        <p:cNvPr id="1" name=""/>
+        <p:cNvGrpSpPr/>
+        <p:nvPr/>
+      </p:nvGrpSpPr>
+      <p:grpSpPr>
+        <a:xfrm>
+          <a:off x="0" y="0"/>
+          <a:ext cx="0" cy="0"/>
+          <a:chOff x="0" y="0"/>
+          <a:chExt cx="0" cy="0"/>
+        </a:xfrm>
+      </p:grpSpPr>
+      <p:sp>
+        <p:nvSpPr>
+          <p:cNvPr id="2" name="Slide Image Placeholder 1"/>
+          <p:cNvSpPr>
+            <a:spLocks noGrp="1" noRot="1" noChangeAspect="1"/>
+          </p:cNvSpPr>
+          <p:nvPr>
+            <p:ph type="sldImg"/>
+          </p:nvPr>
+        </p:nvSpPr>
+        <p:spPr/>
+      </p:sp>
+      <p:sp>
+        <p:nvSpPr>
+          <p:cNvPr id="3" name="Notes Placeholder 2"/>
+          <p:cNvSpPr>
+            <a:spLocks noGrp="1"/>
+          </p:cNvSpPr>
+          <p:nvPr>
+            <p:ph type="body" idx="1"/>
+          </p:nvPr>
+        </p:nvSpPr>
+        <p:spPr/>
+        <p:txBody>
+          <a:bodyPr/>
+          <a:lstStyle/>
+          <a:p>
+            <a:r>
+              <a:rPr lang="en-US" dirty="0" smtClean="0"/>
+              <a:t>Our project describes a Bayesian approach to NCAA college basketball game predictions, employing AM 207 methods in our model fitting process.</a:t>
+            </a:r>
+          </a:p>
+          <a:p>
+            <a:endParaRPr lang="en-US" dirty="0" smtClean="0"/>
+          </a:p>
+          <a:p>
+            <a:r>
+              <a:rPr lang="en-US" dirty="0" smtClean="0"/>
+              <a:t>We will describe our data, and our variable selection and posterior sampling procedures, then evaluate our model against the actual 2015 NCAA Tournament.</a:t>
+            </a:r>
+          </a:p>
+        </p:txBody>
+      </p:sp>
+      <p:sp>
+        <p:nvSpPr>
+          <p:cNvPr id="4" name="Slide Number Placeholder 3"/>
+          <p:cNvSpPr>
+            <a:spLocks noGrp="1"/>
+          </p:cNvSpPr>
+          <p:nvPr>
+            <p:ph type="sldNum" sz="quarter" idx="10"/>
+          </p:nvPr>
+        </p:nvSpPr>
+        <p:spPr/>
+        <p:txBody>
+          <a:bodyPr/>
+          <a:lstStyle/>
+          <a:p>
+            <a:fld id="{C903A796-7CA2-BF49-9968-373C49633B76}" type="slidenum">
+              <a:rPr lang="en-US" smtClean="0"/>
+              <a:t>2</a:t>
+            </a:fld>
+            <a:endParaRPr lang="en-US"/>
+          </a:p>
+        </p:txBody>
+      </p:sp>
+    </p:spTree>
+    <p:extLst>
+      <p:ext uri="{BB962C8B-B14F-4D97-AF65-F5344CB8AC3E}">
+        <p14:creationId xmlns:p14="http://schemas.microsoft.com/office/powerpoint/2010/main" val="2417185694"/>
+      </p:ext>
+    </p:extLst>
+  </p:cSld>
+  <p:clrMapOvr>
+    <a:masterClrMapping/>
+  </p:clrMapOvr>
+</p:notes>
+</file>
+
+<file path=ppt/notesSlides/notesSlide3.xml><?xml version="1.0" encoding="utf-8"?>
+<p:notes xmlns:a="http://schemas.openxmlformats.org/drawingml/2006/main" xmlns:r="http://schemas.openxmlformats.org/officeDocument/2006/relationships" xmlns:p="http://schemas.openxmlformats.org/presentationml/2006/main">
+  <p:cSld>
+    <p:spTree>
+      <p:nvGrpSpPr>
+        <p:cNvPr id="1" name=""/>
+        <p:cNvGrpSpPr/>
+        <p:nvPr/>
+      </p:nvGrpSpPr>
+      <p:grpSpPr>
+        <a:xfrm>
+          <a:off x="0" y="0"/>
+          <a:ext cx="0" cy="0"/>
+          <a:chOff x="0" y="0"/>
+          <a:chExt cx="0" cy="0"/>
+        </a:xfrm>
+      </p:grpSpPr>
+      <p:sp>
+        <p:nvSpPr>
+          <p:cNvPr id="2" name="Slide Image Placeholder 1"/>
+          <p:cNvSpPr>
+            <a:spLocks noGrp="1" noRot="1" noChangeAspect="1"/>
+          </p:cNvSpPr>
+          <p:nvPr>
+            <p:ph type="sldImg"/>
+          </p:nvPr>
+        </p:nvSpPr>
+        <p:spPr/>
+      </p:sp>
+      <p:sp>
+        <p:nvSpPr>
+          <p:cNvPr id="3" name="Notes Placeholder 2"/>
+          <p:cNvSpPr>
+            <a:spLocks noGrp="1"/>
+          </p:cNvSpPr>
+          <p:nvPr>
+            <p:ph type="body" idx="1"/>
+          </p:nvPr>
+        </p:nvSpPr>
+        <p:spPr/>
+        <p:txBody>
+          <a:bodyPr/>
+          <a:lstStyle/>
+          <a:p>
+            <a:r>
+              <a:rPr lang="en-US" dirty="0" smtClean="0"/>
+              <a:t>To fit our model, we used team statistics from Ken Pomeroy, a notable college basketball statistician.</a:t>
+            </a:r>
+          </a:p>
+          <a:p>
+            <a:endParaRPr lang="en-US" dirty="0" smtClean="0"/>
+          </a:p>
+          <a:p>
+            <a:r>
+              <a:rPr lang="en-US" dirty="0" smtClean="0"/>
+              <a:t>We also obtained data for 33,000 basketball games, to ensure a comprehensive model.</a:t>
+            </a:r>
+            <a:endParaRPr lang="en-US" dirty="0"/>
+          </a:p>
+        </p:txBody>
+      </p:sp>
+      <p:sp>
+        <p:nvSpPr>
+          <p:cNvPr id="4" name="Slide Number Placeholder 3"/>
+          <p:cNvSpPr>
+            <a:spLocks noGrp="1"/>
+          </p:cNvSpPr>
+          <p:nvPr>
+            <p:ph type="sldNum" sz="quarter" idx="10"/>
+          </p:nvPr>
+        </p:nvSpPr>
+        <p:spPr/>
+        <p:txBody>
+          <a:bodyPr/>
+          <a:lstStyle/>
+          <a:p>
+            <a:fld id="{C903A796-7CA2-BF49-9968-373C49633B76}" type="slidenum">
+              <a:rPr lang="en-US" smtClean="0"/>
+              <a:t>3</a:t>
+            </a:fld>
+            <a:endParaRPr lang="en-US"/>
+          </a:p>
+        </p:txBody>
+      </p:sp>
+    </p:spTree>
+    <p:extLst>
+      <p:ext uri="{BB962C8B-B14F-4D97-AF65-F5344CB8AC3E}">
+        <p14:creationId xmlns:p14="http://schemas.microsoft.com/office/powerpoint/2010/main" val="955846348"/>
+      </p:ext>
+    </p:extLst>
+  </p:cSld>
+  <p:clrMapOvr>
+    <a:masterClrMapping/>
+  </p:clrMapOvr>
+</p:notes>
+</file>
+
+<file path=ppt/notesSlides/notesSlide4.xml><?xml version="1.0" encoding="utf-8"?>
+<p:notes xmlns:a="http://schemas.openxmlformats.org/drawingml/2006/main" xmlns:r="http://schemas.openxmlformats.org/officeDocument/2006/relationships" xmlns:p="http://schemas.openxmlformats.org/presentationml/2006/main">
+  <p:cSld>
+    <p:spTree>
+      <p:nvGrpSpPr>
+        <p:cNvPr id="1" name=""/>
+        <p:cNvGrpSpPr/>
+        <p:nvPr/>
+      </p:nvGrpSpPr>
+      <p:grpSpPr>
+        <a:xfrm>
+          <a:off x="0" y="0"/>
+          <a:ext cx="0" cy="0"/>
+          <a:chOff x="0" y="0"/>
+          <a:chExt cx="0" cy="0"/>
+        </a:xfrm>
+      </p:grpSpPr>
+      <p:sp>
+        <p:nvSpPr>
+          <p:cNvPr id="2" name="Slide Image Placeholder 1"/>
+          <p:cNvSpPr>
+            <a:spLocks noGrp="1" noRot="1" noChangeAspect="1"/>
+          </p:cNvSpPr>
+          <p:nvPr>
+            <p:ph type="sldImg"/>
+          </p:nvPr>
+        </p:nvSpPr>
+        <p:spPr/>
+      </p:sp>
+      <p:sp>
+        <p:nvSpPr>
+          <p:cNvPr id="3" name="Notes Placeholder 2"/>
+          <p:cNvSpPr>
+            <a:spLocks noGrp="1"/>
+          </p:cNvSpPr>
+          <p:nvPr>
+            <p:ph type="body" idx="1"/>
+          </p:nvPr>
+        </p:nvSpPr>
+        <p:spPr/>
+        <p:txBody>
+          <a:bodyPr/>
+          <a:lstStyle/>
+          <a:p>
+            <a:r>
+              <a:rPr lang="en-US" dirty="0" smtClean="0"/>
+              <a:t>Our raw dataset featured a wide variety of features, and we did not wish to blindly include all of them in our model.</a:t>
+            </a:r>
+          </a:p>
+          <a:p>
+            <a:endParaRPr lang="en-US" dirty="0" smtClean="0"/>
+          </a:p>
+          <a:p>
+            <a:r>
+              <a:rPr lang="en-US" dirty="0" smtClean="0"/>
+              <a:t>To select features for our final model, we tested covariate importance using Random Forests and used cross-validation to identify the most important features.</a:t>
+            </a:r>
+            <a:endParaRPr lang="en-US" dirty="0"/>
+          </a:p>
+        </p:txBody>
+      </p:sp>
+      <p:sp>
+        <p:nvSpPr>
+          <p:cNvPr id="4" name="Slide Number Placeholder 3"/>
+          <p:cNvSpPr>
+            <a:spLocks noGrp="1"/>
+          </p:cNvSpPr>
+          <p:nvPr>
+            <p:ph type="sldNum" sz="quarter" idx="10"/>
+          </p:nvPr>
+        </p:nvSpPr>
+        <p:spPr/>
+        <p:txBody>
+          <a:bodyPr/>
+          <a:lstStyle/>
+          <a:p>
+            <a:fld id="{C903A796-7CA2-BF49-9968-373C49633B76}" type="slidenum">
+              <a:rPr lang="en-US" smtClean="0"/>
+              <a:t>4</a:t>
+            </a:fld>
+            <a:endParaRPr lang="en-US"/>
+          </a:p>
+        </p:txBody>
+      </p:sp>
+    </p:spTree>
+    <p:extLst>
+      <p:ext uri="{BB962C8B-B14F-4D97-AF65-F5344CB8AC3E}">
+        <p14:creationId xmlns:p14="http://schemas.microsoft.com/office/powerpoint/2010/main" val="1160179492"/>
+      </p:ext>
+    </p:extLst>
+  </p:cSld>
+  <p:clrMapOvr>
+    <a:masterClrMapping/>
+  </p:clrMapOvr>
+</p:notes>
+</file>
+
+<file path=ppt/notesSlides/notesSlide5.xml><?xml version="1.0" encoding="utf-8"?>
+<p:notes xmlns:a="http://schemas.openxmlformats.org/drawingml/2006/main" xmlns:r="http://schemas.openxmlformats.org/officeDocument/2006/relationships" xmlns:p="http://schemas.openxmlformats.org/presentationml/2006/main">
+  <p:cSld>
+    <p:spTree>
+      <p:nvGrpSpPr>
+        <p:cNvPr id="1" name=""/>
+        <p:cNvGrpSpPr/>
+        <p:nvPr/>
+      </p:nvGrpSpPr>
+      <p:grpSpPr>
+        <a:xfrm>
+          <a:off x="0" y="0"/>
+          <a:ext cx="0" cy="0"/>
+          <a:chOff x="0" y="0"/>
+          <a:chExt cx="0" cy="0"/>
+        </a:xfrm>
+      </p:grpSpPr>
+      <p:sp>
+        <p:nvSpPr>
+          <p:cNvPr id="2" name="Slide Image Placeholder 1"/>
+          <p:cNvSpPr>
+            <a:spLocks noGrp="1" noRot="1" noChangeAspect="1"/>
+          </p:cNvSpPr>
+          <p:nvPr>
+            <p:ph type="sldImg"/>
+          </p:nvPr>
+        </p:nvSpPr>
+        <p:spPr/>
+      </p:sp>
+      <p:sp>
+        <p:nvSpPr>
+          <p:cNvPr id="3" name="Notes Placeholder 2"/>
+          <p:cNvSpPr>
+            <a:spLocks noGrp="1"/>
+          </p:cNvSpPr>
+          <p:nvPr>
+            <p:ph type="body" idx="1"/>
+          </p:nvPr>
+        </p:nvSpPr>
+        <p:spPr/>
+        <p:txBody>
+          <a:bodyPr/>
+          <a:lstStyle/>
+          <a:p>
+            <a:r>
+              <a:rPr lang="en-US" dirty="0" smtClean="0"/>
+              <a:t>We used these features to define our Bayesian logistic regression model.</a:t>
+            </a:r>
+          </a:p>
+          <a:p>
+            <a:endParaRPr lang="en-US" dirty="0" smtClean="0"/>
+          </a:p>
+          <a:p>
+            <a:r>
+              <a:rPr lang="en-US" dirty="0" smtClean="0"/>
+              <a:t>To set our priors, we trained a </a:t>
+            </a:r>
+            <a:r>
+              <a:rPr lang="en-US" dirty="0" err="1" smtClean="0"/>
+              <a:t>frequentist</a:t>
+            </a:r>
+            <a:r>
+              <a:rPr lang="en-US" dirty="0" smtClean="0"/>
+              <a:t> logistic regression model with the same features on 2014 games. We used that model’s coefficient estimates to set our prior means.</a:t>
+            </a:r>
+          </a:p>
+          <a:p>
+            <a:endParaRPr lang="en-US" dirty="0" smtClean="0"/>
+          </a:p>
+          <a:p>
+            <a:r>
+              <a:rPr lang="en-US" dirty="0" smtClean="0"/>
+              <a:t>Finally, we sampled </a:t>
+            </a:r>
+            <a:r>
+              <a:rPr lang="en-US" smtClean="0"/>
+              <a:t>covariate values</a:t>
+            </a:r>
+            <a:r>
+              <a:rPr lang="en-US" baseline="0" smtClean="0"/>
+              <a:t> </a:t>
+            </a:r>
+            <a:r>
+              <a:rPr lang="en-US" smtClean="0"/>
+              <a:t>from </a:t>
+            </a:r>
+            <a:r>
+              <a:rPr lang="en-US" dirty="0" smtClean="0"/>
+              <a:t>our posterior distribution.</a:t>
+            </a:r>
+            <a:endParaRPr lang="en-US" dirty="0"/>
+          </a:p>
+        </p:txBody>
+      </p:sp>
+      <p:sp>
+        <p:nvSpPr>
+          <p:cNvPr id="4" name="Slide Number Placeholder 3"/>
+          <p:cNvSpPr>
+            <a:spLocks noGrp="1"/>
+          </p:cNvSpPr>
+          <p:nvPr>
+            <p:ph type="sldNum" sz="quarter" idx="10"/>
+          </p:nvPr>
+        </p:nvSpPr>
+        <p:spPr/>
+        <p:txBody>
+          <a:bodyPr/>
+          <a:lstStyle/>
+          <a:p>
+            <a:fld id="{C903A796-7CA2-BF49-9968-373C49633B76}" type="slidenum">
+              <a:rPr lang="en-US" smtClean="0"/>
+              <a:t>5</a:t>
+            </a:fld>
+            <a:endParaRPr lang="en-US"/>
+          </a:p>
+        </p:txBody>
+      </p:sp>
+    </p:spTree>
+    <p:extLst>
+      <p:ext uri="{BB962C8B-B14F-4D97-AF65-F5344CB8AC3E}">
+        <p14:creationId xmlns:p14="http://schemas.microsoft.com/office/powerpoint/2010/main" val="4194278680"/>
+      </p:ext>
+    </p:extLst>
+  </p:cSld>
+  <p:clrMapOvr>
+    <a:masterClrMapping/>
+  </p:clrMapOvr>
+</p:notes>
+</file>
+
+<file path=ppt/notesSlides/notesSlide6.xml><?xml version="1.0" encoding="utf-8"?>
+<p:notes xmlns:a="http://schemas.openxmlformats.org/drawingml/2006/main" xmlns:r="http://schemas.openxmlformats.org/officeDocument/2006/relationships" xmlns:p="http://schemas.openxmlformats.org/presentationml/2006/main">
+  <p:cSld>
+    <p:spTree>
+      <p:nvGrpSpPr>
+        <p:cNvPr id="1" name=""/>
+        <p:cNvGrpSpPr/>
+        <p:nvPr/>
+      </p:nvGrpSpPr>
+      <p:grpSpPr>
+        <a:xfrm>
+          <a:off x="0" y="0"/>
+          <a:ext cx="0" cy="0"/>
+          <a:chOff x="0" y="0"/>
+          <a:chExt cx="0" cy="0"/>
+        </a:xfrm>
+      </p:grpSpPr>
+      <p:sp>
+        <p:nvSpPr>
+          <p:cNvPr id="2" name="Slide Image Placeholder 1"/>
+          <p:cNvSpPr>
+            <a:spLocks noGrp="1" noRot="1" noChangeAspect="1"/>
+          </p:cNvSpPr>
+          <p:nvPr>
+            <p:ph type="sldImg"/>
+          </p:nvPr>
+        </p:nvSpPr>
+        <p:spPr/>
+      </p:sp>
+      <p:sp>
+        <p:nvSpPr>
+          <p:cNvPr id="3" name="Notes Placeholder 2"/>
+          <p:cNvSpPr>
+            <a:spLocks noGrp="1"/>
+          </p:cNvSpPr>
+          <p:nvPr>
+            <p:ph type="body" idx="1"/>
+          </p:nvPr>
+        </p:nvSpPr>
+        <p:spPr/>
+        <p:txBody>
+          <a:bodyPr/>
+          <a:lstStyle/>
+          <a:p>
+            <a:r>
+              <a:rPr lang="en-US" dirty="0" smtClean="0"/>
+              <a:t>For sampling, we employed both Metropolis-Hastings and Slice Sampling.</a:t>
+            </a:r>
+          </a:p>
+          <a:p>
+            <a:endParaRPr lang="en-US" dirty="0" smtClean="0"/>
+          </a:p>
+          <a:p>
+            <a:r>
+              <a:rPr lang="en-US" dirty="0" smtClean="0"/>
+              <a:t>The former required significant thinning and burn-in to avoid autocorrelation; the latter required no thinning at all.</a:t>
+            </a:r>
+          </a:p>
+          <a:p>
+            <a:endParaRPr lang="en-US" dirty="0" smtClean="0"/>
+          </a:p>
+          <a:p>
+            <a:r>
+              <a:rPr lang="en-US" dirty="0" smtClean="0"/>
+              <a:t>Though overall, Metropolis-Hastings ran the fastest.</a:t>
+            </a:r>
+            <a:endParaRPr lang="en-US" dirty="0"/>
+          </a:p>
+        </p:txBody>
+      </p:sp>
+      <p:sp>
+        <p:nvSpPr>
+          <p:cNvPr id="4" name="Slide Number Placeholder 3"/>
+          <p:cNvSpPr>
+            <a:spLocks noGrp="1"/>
+          </p:cNvSpPr>
+          <p:nvPr>
+            <p:ph type="sldNum" sz="quarter" idx="10"/>
+          </p:nvPr>
+        </p:nvSpPr>
+        <p:spPr/>
+        <p:txBody>
+          <a:bodyPr/>
+          <a:lstStyle/>
+          <a:p>
+            <a:fld id="{C903A796-7CA2-BF49-9968-373C49633B76}" type="slidenum">
+              <a:rPr lang="en-US" smtClean="0"/>
+              <a:t>6</a:t>
+            </a:fld>
+            <a:endParaRPr lang="en-US"/>
+          </a:p>
+        </p:txBody>
+      </p:sp>
+    </p:spTree>
+    <p:extLst>
+      <p:ext uri="{BB962C8B-B14F-4D97-AF65-F5344CB8AC3E}">
+        <p14:creationId xmlns:p14="http://schemas.microsoft.com/office/powerpoint/2010/main" val="1199647074"/>
+      </p:ext>
+    </p:extLst>
+  </p:cSld>
+  <p:clrMapOvr>
+    <a:masterClrMapping/>
+  </p:clrMapOvr>
+</p:notes>
+</file>
+
+<file path=ppt/notesSlides/notesSlide7.xml><?xml version="1.0" encoding="utf-8"?>
+<p:notes xmlns:a="http://schemas.openxmlformats.org/drawingml/2006/main" xmlns:r="http://schemas.openxmlformats.org/officeDocument/2006/relationships" xmlns:p="http://schemas.openxmlformats.org/presentationml/2006/main">
+  <p:cSld>
+    <p:spTree>
+      <p:nvGrpSpPr>
+        <p:cNvPr id="1" name=""/>
+        <p:cNvGrpSpPr/>
+        <p:nvPr/>
+      </p:nvGrpSpPr>
+      <p:grpSpPr>
+        <a:xfrm>
+          <a:off x="0" y="0"/>
+          <a:ext cx="0" cy="0"/>
+          <a:chOff x="0" y="0"/>
+          <a:chExt cx="0" cy="0"/>
+        </a:xfrm>
+      </p:grpSpPr>
+      <p:sp>
+        <p:nvSpPr>
+          <p:cNvPr id="2" name="Slide Image Placeholder 1"/>
+          <p:cNvSpPr>
+            <a:spLocks noGrp="1" noRot="1" noChangeAspect="1"/>
+          </p:cNvSpPr>
+          <p:nvPr>
+            <p:ph type="sldImg"/>
+          </p:nvPr>
+        </p:nvSpPr>
+        <p:spPr/>
+      </p:sp>
+      <p:sp>
+        <p:nvSpPr>
+          <p:cNvPr id="3" name="Notes Placeholder 2"/>
+          <p:cNvSpPr>
+            <a:spLocks noGrp="1"/>
+          </p:cNvSpPr>
+          <p:nvPr>
+            <p:ph type="body" idx="1"/>
+          </p:nvPr>
+        </p:nvSpPr>
+        <p:spPr/>
+        <p:txBody>
+          <a:bodyPr/>
+          <a:lstStyle/>
+          <a:p>
+            <a:r>
+              <a:rPr lang="en-US" dirty="0" smtClean="0"/>
+              <a:t>Both sampling methods showed diagnostic results that indicate convergence.</a:t>
+            </a:r>
+          </a:p>
+          <a:p>
+            <a:endParaRPr lang="en-US" dirty="0" smtClean="0"/>
+          </a:p>
+          <a:p>
+            <a:r>
+              <a:rPr lang="en-US" dirty="0" smtClean="0"/>
+              <a:t>Slice Sampling appears to have performed marginally better in this regard.</a:t>
+            </a:r>
+          </a:p>
+          <a:p>
+            <a:endParaRPr lang="en-US" dirty="0" smtClean="0"/>
+          </a:p>
+          <a:p>
+            <a:r>
+              <a:rPr lang="en-US" dirty="0" smtClean="0"/>
+              <a:t>With our parameter samples in hand, we tested our maximum a posteriori coefficient estimates against a test dataset, resulting in 76% accuracy—far above the 50% rate we would expect from random guessing.</a:t>
+            </a:r>
+            <a:endParaRPr lang="en-US" dirty="0"/>
+          </a:p>
+        </p:txBody>
+      </p:sp>
+      <p:sp>
+        <p:nvSpPr>
+          <p:cNvPr id="4" name="Slide Number Placeholder 3"/>
+          <p:cNvSpPr>
+            <a:spLocks noGrp="1"/>
+          </p:cNvSpPr>
+          <p:nvPr>
+            <p:ph type="sldNum" sz="quarter" idx="10"/>
+          </p:nvPr>
+        </p:nvSpPr>
+        <p:spPr/>
+        <p:txBody>
+          <a:bodyPr/>
+          <a:lstStyle/>
+          <a:p>
+            <a:fld id="{C903A796-7CA2-BF49-9968-373C49633B76}" type="slidenum">
+              <a:rPr lang="en-US" smtClean="0"/>
+              <a:t>7</a:t>
+            </a:fld>
+            <a:endParaRPr lang="en-US"/>
+          </a:p>
+        </p:txBody>
+      </p:sp>
+    </p:spTree>
+    <p:extLst>
+      <p:ext uri="{BB962C8B-B14F-4D97-AF65-F5344CB8AC3E}">
+        <p14:creationId xmlns:p14="http://schemas.microsoft.com/office/powerpoint/2010/main" val="3196089299"/>
+      </p:ext>
+    </p:extLst>
+  </p:cSld>
+  <p:clrMapOvr>
+    <a:masterClrMapping/>
+  </p:clrMapOvr>
+</p:notes>
+</file>
+
+<file path=ppt/notesSlides/notesSlide8.xml><?xml version="1.0" encoding="utf-8"?>
+<p:notes xmlns:a="http://schemas.openxmlformats.org/drawingml/2006/main" xmlns:r="http://schemas.openxmlformats.org/officeDocument/2006/relationships" xmlns:p="http://schemas.openxmlformats.org/presentationml/2006/main">
+  <p:cSld>
+    <p:spTree>
+      <p:nvGrpSpPr>
+        <p:cNvPr id="1" name=""/>
+        <p:cNvGrpSpPr/>
+        <p:nvPr/>
+      </p:nvGrpSpPr>
+      <p:grpSpPr>
+        <a:xfrm>
+          <a:off x="0" y="0"/>
+          <a:ext cx="0" cy="0"/>
+          <a:chOff x="0" y="0"/>
+          <a:chExt cx="0" cy="0"/>
+        </a:xfrm>
+      </p:grpSpPr>
+      <p:sp>
+        <p:nvSpPr>
+          <p:cNvPr id="2" name="Slide Image Placeholder 1"/>
+          <p:cNvSpPr>
+            <a:spLocks noGrp="1" noRot="1" noChangeAspect="1"/>
+          </p:cNvSpPr>
+          <p:nvPr>
+            <p:ph type="sldImg"/>
+          </p:nvPr>
+        </p:nvSpPr>
+        <p:spPr/>
+      </p:sp>
+      <p:sp>
+        <p:nvSpPr>
+          <p:cNvPr id="3" name="Notes Placeholder 2"/>
+          <p:cNvSpPr>
+            <a:spLocks noGrp="1"/>
+          </p:cNvSpPr>
+          <p:nvPr>
+            <p:ph type="body" idx="1"/>
+          </p:nvPr>
+        </p:nvSpPr>
+        <p:spPr/>
+        <p:txBody>
+          <a:bodyPr/>
+          <a:lstStyle/>
+          <a:p>
+            <a:r>
+              <a:rPr lang="en-US" dirty="0" smtClean="0"/>
+              <a:t>To further test our model, we used our posterior samples to simulate the 2015 NCAA Tournament 20,000 times.</a:t>
+            </a:r>
+          </a:p>
+          <a:p>
+            <a:endParaRPr lang="en-US" dirty="0" smtClean="0"/>
+          </a:p>
+          <a:p>
+            <a:r>
+              <a:rPr lang="en-US" dirty="0" smtClean="0"/>
+              <a:t>In each simulation, we randomly picked the winner of each game according to our model’s predictions.</a:t>
+            </a:r>
+            <a:endParaRPr lang="en-US" dirty="0"/>
+          </a:p>
+        </p:txBody>
+      </p:sp>
+      <p:sp>
+        <p:nvSpPr>
+          <p:cNvPr id="4" name="Slide Number Placeholder 3"/>
+          <p:cNvSpPr>
+            <a:spLocks noGrp="1"/>
+          </p:cNvSpPr>
+          <p:nvPr>
+            <p:ph type="sldNum" sz="quarter" idx="10"/>
+          </p:nvPr>
+        </p:nvSpPr>
+        <p:spPr/>
+        <p:txBody>
+          <a:bodyPr/>
+          <a:lstStyle/>
+          <a:p>
+            <a:fld id="{C903A796-7CA2-BF49-9968-373C49633B76}" type="slidenum">
+              <a:rPr lang="en-US" smtClean="0"/>
+              <a:t>8</a:t>
+            </a:fld>
+            <a:endParaRPr lang="en-US"/>
+          </a:p>
+        </p:txBody>
+      </p:sp>
+    </p:spTree>
+    <p:extLst>
+      <p:ext uri="{BB962C8B-B14F-4D97-AF65-F5344CB8AC3E}">
+        <p14:creationId xmlns:p14="http://schemas.microsoft.com/office/powerpoint/2010/main" val="1956693965"/>
+      </p:ext>
+    </p:extLst>
+  </p:cSld>
+  <p:clrMapOvr>
+    <a:masterClrMapping/>
+  </p:clrMapOvr>
+</p:notes>
+</file>
+
+<file path=ppt/notesSlides/notesSlide9.xml><?xml version="1.0" encoding="utf-8"?>
+<p:notes xmlns:a="http://schemas.openxmlformats.org/drawingml/2006/main" xmlns:r="http://schemas.openxmlformats.org/officeDocument/2006/relationships" xmlns:p="http://schemas.openxmlformats.org/presentationml/2006/main">
+  <p:cSld>
+    <p:spTree>
+      <p:nvGrpSpPr>
+        <p:cNvPr id="1" name=""/>
+        <p:cNvGrpSpPr/>
+        <p:nvPr/>
+      </p:nvGrpSpPr>
+      <p:grpSpPr>
+        <a:xfrm>
+          <a:off x="0" y="0"/>
+          <a:ext cx="0" cy="0"/>
+          <a:chOff x="0" y="0"/>
+          <a:chExt cx="0" cy="0"/>
+        </a:xfrm>
+      </p:grpSpPr>
+      <p:sp>
+        <p:nvSpPr>
+          <p:cNvPr id="2" name="Slide Image Placeholder 1"/>
+          <p:cNvSpPr>
+            <a:spLocks noGrp="1" noRot="1" noChangeAspect="1"/>
+          </p:cNvSpPr>
+          <p:nvPr>
+            <p:ph type="sldImg"/>
+          </p:nvPr>
+        </p:nvSpPr>
+        <p:spPr/>
+      </p:sp>
+      <p:sp>
+        <p:nvSpPr>
+          <p:cNvPr id="3" name="Notes Placeholder 2"/>
+          <p:cNvSpPr>
+            <a:spLocks noGrp="1"/>
+          </p:cNvSpPr>
+          <p:nvPr>
+            <p:ph type="body" idx="1"/>
+          </p:nvPr>
+        </p:nvSpPr>
+        <p:spPr/>
+        <p:txBody>
+          <a:bodyPr/>
+          <a:lstStyle/>
+          <a:p>
+            <a:r>
+              <a:rPr lang="en-US" dirty="0" smtClean="0"/>
+              <a:t>The real-life Final Four included three of the top five teams according to our simulations, though undefeated Kentucky failed to win the championship as our model predicted most often.</a:t>
+            </a:r>
+          </a:p>
+          <a:p>
+            <a:endParaRPr lang="en-US" dirty="0" smtClean="0"/>
+          </a:p>
+          <a:p>
+            <a:r>
+              <a:rPr lang="en-US" dirty="0" smtClean="0"/>
+              <a:t>Highlighting the “madness” in March Madness, we also failed to foresee the early upsets of Villanova and Virginia, two of our top teams.</a:t>
+            </a:r>
+            <a:endParaRPr lang="en-US" dirty="0"/>
+          </a:p>
+        </p:txBody>
+      </p:sp>
+      <p:sp>
+        <p:nvSpPr>
+          <p:cNvPr id="4" name="Slide Number Placeholder 3"/>
+          <p:cNvSpPr>
+            <a:spLocks noGrp="1"/>
+          </p:cNvSpPr>
+          <p:nvPr>
+            <p:ph type="sldNum" sz="quarter" idx="10"/>
+          </p:nvPr>
+        </p:nvSpPr>
+        <p:spPr/>
+        <p:txBody>
+          <a:bodyPr/>
+          <a:lstStyle/>
+          <a:p>
+            <a:fld id="{C903A796-7CA2-BF49-9968-373C49633B76}" type="slidenum">
+              <a:rPr lang="en-US" smtClean="0"/>
+              <a:t>9</a:t>
+            </a:fld>
+            <a:endParaRPr lang="en-US"/>
+          </a:p>
+        </p:txBody>
+      </p:sp>
+    </p:spTree>
+    <p:extLst>
+      <p:ext uri="{BB962C8B-B14F-4D97-AF65-F5344CB8AC3E}">
+        <p14:creationId xmlns:p14="http://schemas.microsoft.com/office/powerpoint/2010/main" val="997687174"/>
+      </p:ext>
+    </p:extLst>
+  </p:cSld>
+  <p:clrMapOvr>
+    <a:masterClrMapping/>
+  </p:clrMapOvr>
+</p:notes>
 </file>
 
 <file path=ppt/slideLayouts/slideLayout1.xml><?xml version="1.0" encoding="utf-8"?>
@@ -3871,6 +5240,14 @@
   <p:clrMapOvr>
     <a:masterClrMapping/>
   </p:clrMapOvr>
+  <mc:AlternateContent xmlns:mc="http://schemas.openxmlformats.org/markup-compatibility/2006">
+    <mc:Choice xmlns:p14="http://schemas.microsoft.com/office/powerpoint/2010/main" Requires="p14">
+      <p:transition spd="slow" p14:dur="2000" advTm="3373"/>
+    </mc:Choice>
+    <mc:Fallback>
+      <p:transition xmlns:p14="http://schemas.microsoft.com/office/powerpoint/2010/main" spd="slow" advTm="3373"/>
+    </mc:Fallback>
+  </mc:AlternateContent>
   <p:timing>
     <p:tnLst>
       <p:par>
@@ -4053,7 +5430,7 @@
           <p:nvPr/>
         </p:nvPicPr>
         <p:blipFill>
-          <a:blip r:embed="rId2" cstate="print">
+          <a:blip r:embed="rId3" cstate="print">
             <a:extLst>
               <a:ext uri="{28A0092B-C50C-407E-A947-70E740481C1C}">
                 <a14:useLocalDpi xmlns:a14="http://schemas.microsoft.com/office/drawing/2010/main" val="0"/>
@@ -4077,36 +5454,6 @@
       <p:pic>
         <p:nvPicPr>
           <p:cNvPr id="22" name="Picture 21" descr="Wisconsin.pdf"/>
-          <p:cNvPicPr>
-            <a:picLocks noChangeAspect="1"/>
-          </p:cNvPicPr>
-          <p:nvPr/>
-        </p:nvPicPr>
-        <p:blipFill>
-          <a:blip r:embed="rId3">
-            <a:extLst>
-              <a:ext uri="{28A0092B-C50C-407E-A947-70E740481C1C}">
-                <a14:useLocalDpi xmlns:a14="http://schemas.microsoft.com/office/drawing/2010/main" val="0"/>
-              </a:ext>
-            </a:extLst>
-          </a:blip>
-          <a:stretch>
-            <a:fillRect/>
-          </a:stretch>
-        </p:blipFill>
-        <p:spPr>
-          <a:xfrm>
-            <a:off x="2147104" y="3283529"/>
-            <a:ext cx="529389" cy="502920"/>
-          </a:xfrm>
-          <a:prstGeom prst="rect">
-            <a:avLst/>
-          </a:prstGeom>
-        </p:spPr>
-      </p:pic>
-      <p:pic>
-        <p:nvPicPr>
-          <p:cNvPr id="25" name="Picture 24" descr="Duke.pdf"/>
           <p:cNvPicPr>
             <a:picLocks noChangeAspect="1"/>
           </p:cNvPicPr>
@@ -4126,329 +5473,17 @@
         </p:blipFill>
         <p:spPr>
           <a:xfrm>
-            <a:off x="2142857" y="3868330"/>
-            <a:ext cx="537882" cy="457200"/>
+            <a:off x="2147104" y="3283529"/>
+            <a:ext cx="529389" cy="502920"/>
           </a:xfrm>
           <a:prstGeom prst="rect">
             <a:avLst/>
           </a:prstGeom>
         </p:spPr>
       </p:pic>
-      <p:sp>
-        <p:nvSpPr>
-          <p:cNvPr id="27" name="TextBox 26"/>
-          <p:cNvSpPr txBox="1"/>
-          <p:nvPr/>
-        </p:nvSpPr>
-        <p:spPr>
-          <a:xfrm>
-            <a:off x="3333954" y="2780726"/>
-            <a:ext cx="2339534" cy="369332"/>
-          </a:xfrm>
-          <a:prstGeom prst="rect">
-            <a:avLst/>
-          </a:prstGeom>
-          <a:noFill/>
-        </p:spPr>
-        <p:txBody>
-          <a:bodyPr wrap="square" rtlCol="0">
-            <a:spAutoFit/>
-          </a:bodyPr>
-          <a:lstStyle/>
-          <a:p>
-            <a:pPr algn="ctr"/>
-            <a:r>
-              <a:rPr lang="en-US" dirty="0" smtClean="0">
-                <a:solidFill>
-                  <a:srgbClr val="7F7F7F"/>
-                </a:solidFill>
-              </a:rPr>
-              <a:t>59%</a:t>
-            </a:r>
-            <a:endParaRPr lang="en-US" dirty="0">
-              <a:solidFill>
-                <a:srgbClr val="7F7F7F"/>
-              </a:solidFill>
-            </a:endParaRPr>
-          </a:p>
-        </p:txBody>
-      </p:sp>
-      <p:sp>
-        <p:nvSpPr>
-          <p:cNvPr id="28" name="TextBox 27"/>
-          <p:cNvSpPr txBox="1"/>
-          <p:nvPr/>
-        </p:nvSpPr>
-        <p:spPr>
-          <a:xfrm>
-            <a:off x="3333954" y="3357938"/>
-            <a:ext cx="2339534" cy="369332"/>
-          </a:xfrm>
-          <a:prstGeom prst="rect">
-            <a:avLst/>
-          </a:prstGeom>
-          <a:noFill/>
-        </p:spPr>
-        <p:txBody>
-          <a:bodyPr wrap="square" rtlCol="0">
-            <a:spAutoFit/>
-          </a:bodyPr>
-          <a:lstStyle/>
-          <a:p>
-            <a:pPr algn="ctr"/>
-            <a:r>
-              <a:rPr lang="en-US" b="1" dirty="0" smtClean="0"/>
-              <a:t>41%</a:t>
-            </a:r>
-            <a:endParaRPr lang="en-US" b="1" dirty="0"/>
-          </a:p>
-        </p:txBody>
-      </p:sp>
-      <p:sp>
-        <p:nvSpPr>
-          <p:cNvPr id="32" name="TextBox 31"/>
-          <p:cNvSpPr txBox="1"/>
-          <p:nvPr/>
-        </p:nvSpPr>
-        <p:spPr>
-          <a:xfrm>
-            <a:off x="3333954" y="3920719"/>
-            <a:ext cx="2339534" cy="369332"/>
-          </a:xfrm>
-          <a:prstGeom prst="rect">
-            <a:avLst/>
-          </a:prstGeom>
-          <a:noFill/>
-        </p:spPr>
-        <p:txBody>
-          <a:bodyPr wrap="square" rtlCol="0">
-            <a:spAutoFit/>
-          </a:bodyPr>
-          <a:lstStyle/>
-          <a:p>
-            <a:pPr algn="ctr"/>
-            <a:r>
-              <a:rPr lang="en-US" b="1" dirty="0" smtClean="0"/>
-              <a:t>75%</a:t>
-            </a:r>
-            <a:endParaRPr lang="en-US" b="1" dirty="0"/>
-          </a:p>
-        </p:txBody>
-      </p:sp>
-      <p:sp>
-        <p:nvSpPr>
-          <p:cNvPr id="34" name="TextBox 33"/>
-          <p:cNvSpPr txBox="1"/>
-          <p:nvPr/>
-        </p:nvSpPr>
-        <p:spPr>
-          <a:xfrm>
-            <a:off x="5677636" y="2780726"/>
-            <a:ext cx="2043849" cy="369332"/>
-          </a:xfrm>
-          <a:prstGeom prst="rect">
-            <a:avLst/>
-          </a:prstGeom>
-          <a:noFill/>
-        </p:spPr>
-        <p:txBody>
-          <a:bodyPr wrap="square" rtlCol="0">
-            <a:spAutoFit/>
-          </a:bodyPr>
-          <a:lstStyle/>
-          <a:p>
-            <a:pPr algn="ctr"/>
-            <a:r>
-              <a:rPr lang="en-US" dirty="0" smtClean="0">
-                <a:solidFill>
-                  <a:schemeClr val="tx1">
-                    <a:lumMod val="50000"/>
-                    <a:lumOff val="50000"/>
-                  </a:schemeClr>
-                </a:solidFill>
-              </a:rPr>
-              <a:t>45%</a:t>
-            </a:r>
-            <a:endParaRPr lang="en-US" dirty="0">
-              <a:solidFill>
-                <a:schemeClr val="tx1">
-                  <a:lumMod val="50000"/>
-                  <a:lumOff val="50000"/>
-                </a:schemeClr>
-              </a:solidFill>
-            </a:endParaRPr>
-          </a:p>
-        </p:txBody>
-      </p:sp>
-      <p:sp>
-        <p:nvSpPr>
-          <p:cNvPr id="35" name="TextBox 34"/>
-          <p:cNvSpPr txBox="1"/>
-          <p:nvPr/>
-        </p:nvSpPr>
-        <p:spPr>
-          <a:xfrm>
-            <a:off x="5677636" y="3357938"/>
-            <a:ext cx="2043849" cy="369332"/>
-          </a:xfrm>
-          <a:prstGeom prst="rect">
-            <a:avLst/>
-          </a:prstGeom>
-          <a:noFill/>
-        </p:spPr>
-        <p:txBody>
-          <a:bodyPr wrap="square" rtlCol="0">
-            <a:spAutoFit/>
-          </a:bodyPr>
-          <a:lstStyle/>
-          <a:p>
-            <a:pPr algn="ctr"/>
-            <a:r>
-              <a:rPr lang="en-US" dirty="0" smtClean="0">
-                <a:solidFill>
-                  <a:schemeClr val="tx1">
-                    <a:lumMod val="50000"/>
-                    <a:lumOff val="50000"/>
-                  </a:schemeClr>
-                </a:solidFill>
-              </a:rPr>
-              <a:t>29%</a:t>
-            </a:r>
-            <a:endParaRPr lang="en-US" dirty="0">
-              <a:solidFill>
-                <a:schemeClr val="tx1">
-                  <a:lumMod val="50000"/>
-                  <a:lumOff val="50000"/>
-                </a:schemeClr>
-              </a:solidFill>
-            </a:endParaRPr>
-          </a:p>
-        </p:txBody>
-      </p:sp>
-      <p:sp>
-        <p:nvSpPr>
-          <p:cNvPr id="38" name="TextBox 37"/>
-          <p:cNvSpPr txBox="1"/>
-          <p:nvPr/>
-        </p:nvSpPr>
-        <p:spPr>
-          <a:xfrm>
-            <a:off x="5677636" y="3920719"/>
-            <a:ext cx="2043849" cy="369332"/>
-          </a:xfrm>
-          <a:prstGeom prst="rect">
-            <a:avLst/>
-          </a:prstGeom>
-          <a:noFill/>
-        </p:spPr>
-        <p:txBody>
-          <a:bodyPr wrap="square" rtlCol="0">
-            <a:spAutoFit/>
-          </a:bodyPr>
-          <a:lstStyle/>
-          <a:p>
-            <a:pPr algn="ctr"/>
-            <a:r>
-              <a:rPr lang="en-US" b="1" dirty="0" smtClean="0"/>
-              <a:t>23%</a:t>
-            </a:r>
-            <a:endParaRPr lang="en-US" b="1" dirty="0"/>
-          </a:p>
-        </p:txBody>
-      </p:sp>
-      <p:sp>
-        <p:nvSpPr>
-          <p:cNvPr id="40" name="TextBox 39"/>
-          <p:cNvSpPr txBox="1"/>
-          <p:nvPr/>
-        </p:nvSpPr>
-        <p:spPr>
-          <a:xfrm>
-            <a:off x="7780978" y="2779599"/>
-            <a:ext cx="3202294" cy="369332"/>
-          </a:xfrm>
-          <a:prstGeom prst="rect">
-            <a:avLst/>
-          </a:prstGeom>
-          <a:noFill/>
-        </p:spPr>
-        <p:txBody>
-          <a:bodyPr wrap="square" rtlCol="0">
-            <a:spAutoFit/>
-          </a:bodyPr>
-          <a:lstStyle/>
-          <a:p>
-            <a:r>
-              <a:rPr lang="en-US" dirty="0" smtClean="0"/>
-              <a:t>Lost in Final Four </a:t>
-            </a:r>
-            <a:endParaRPr lang="en-US" dirty="0"/>
-          </a:p>
-        </p:txBody>
-      </p:sp>
-      <p:sp>
-        <p:nvSpPr>
-          <p:cNvPr id="41" name="TextBox 40"/>
-          <p:cNvSpPr txBox="1"/>
-          <p:nvPr/>
-        </p:nvSpPr>
-        <p:spPr>
-          <a:xfrm>
-            <a:off x="7780978" y="3356811"/>
-            <a:ext cx="3202294" cy="369332"/>
-          </a:xfrm>
-          <a:prstGeom prst="rect">
-            <a:avLst/>
-          </a:prstGeom>
-          <a:noFill/>
-        </p:spPr>
-        <p:txBody>
-          <a:bodyPr wrap="square" rtlCol="0">
-            <a:spAutoFit/>
-          </a:bodyPr>
-          <a:lstStyle/>
-          <a:p>
-            <a:r>
-              <a:rPr lang="en-US" dirty="0" smtClean="0"/>
-              <a:t>Lost in Championship Game</a:t>
-            </a:r>
-            <a:endParaRPr lang="en-US" dirty="0"/>
-          </a:p>
-        </p:txBody>
-      </p:sp>
-      <p:sp>
-        <p:nvSpPr>
-          <p:cNvPr id="45" name="TextBox 44"/>
-          <p:cNvSpPr txBox="1"/>
-          <p:nvPr/>
-        </p:nvSpPr>
-        <p:spPr>
-          <a:xfrm>
-            <a:off x="7780978" y="3919592"/>
-            <a:ext cx="3202294" cy="369332"/>
-          </a:xfrm>
-          <a:prstGeom prst="rect">
-            <a:avLst/>
-          </a:prstGeom>
-          <a:noFill/>
-        </p:spPr>
-        <p:txBody>
-          <a:bodyPr wrap="square" rtlCol="0">
-            <a:spAutoFit/>
-          </a:bodyPr>
-          <a:lstStyle/>
-          <a:p>
-            <a:r>
-              <a:rPr lang="en-US" dirty="0" smtClean="0"/>
-              <a:t>Won Championship</a:t>
-            </a:r>
-            <a:endParaRPr lang="en-US" dirty="0"/>
-          </a:p>
-        </p:txBody>
-      </p:sp>
       <p:pic>
         <p:nvPicPr>
-          <p:cNvPr id="4" name="Picture 3" descr="Michigan State.pdf"/>
+          <p:cNvPr id="25" name="Picture 24" descr="Duke.pdf"/>
           <p:cNvPicPr>
             <a:picLocks noChangeAspect="1"/>
           </p:cNvPicPr>
@@ -4468,8 +5503,8 @@
         </p:blipFill>
         <p:spPr>
           <a:xfrm>
-            <a:off x="2202935" y="4410682"/>
-            <a:ext cx="433552" cy="502920"/>
+            <a:off x="2142857" y="3868330"/>
+            <a:ext cx="537882" cy="457200"/>
           </a:xfrm>
           <a:prstGeom prst="rect">
             <a:avLst/>
@@ -4478,13 +5513,13 @@
       </p:pic>
       <p:sp>
         <p:nvSpPr>
-          <p:cNvPr id="46" name="TextBox 45"/>
+          <p:cNvPr id="27" name="TextBox 26"/>
           <p:cNvSpPr txBox="1"/>
           <p:nvPr/>
         </p:nvSpPr>
         <p:spPr>
           <a:xfrm>
-            <a:off x="3333954" y="4483501"/>
+            <a:off x="3333954" y="2780726"/>
             <a:ext cx="2339534" cy="369332"/>
           </a:xfrm>
           <a:prstGeom prst="rect">
@@ -4505,7 +5540,7 @@
                   <a:srgbClr val="7F7F7F"/>
                 </a:solidFill>
               </a:rPr>
-              <a:t>25%</a:t>
+              <a:t>59%</a:t>
             </a:r>
             <a:endParaRPr lang="en-US" dirty="0">
               <a:solidFill>
@@ -4517,14 +5552,14 @@
       </p:sp>
       <p:sp>
         <p:nvSpPr>
-          <p:cNvPr id="47" name="TextBox 46"/>
+          <p:cNvPr id="28" name="TextBox 27"/>
           <p:cNvSpPr txBox="1"/>
           <p:nvPr/>
         </p:nvSpPr>
         <p:spPr>
           <a:xfrm>
-            <a:off x="5677636" y="4483501"/>
-            <a:ext cx="2043849" cy="369332"/>
+            <a:off x="3333954" y="3357938"/>
+            <a:ext cx="2339534" cy="369332"/>
           </a:xfrm>
           <a:prstGeom prst="rect">
             <a:avLst/>
@@ -4539,31 +5574,23 @@
           <a:p>
             <a:pPr algn="ctr"/>
             <a:r>
-              <a:rPr lang="en-US" dirty="0" smtClean="0">
-                <a:solidFill>
-                  <a:srgbClr val="7F7F7F"/>
-                </a:solidFill>
-              </a:rPr>
-              <a:t>3.2%</a:t>
-            </a:r>
-            <a:endParaRPr lang="en-US" dirty="0">
-              <a:solidFill>
-                <a:srgbClr val="7F7F7F"/>
-              </a:solidFill>
-            </a:endParaRPr>
-          </a:p>
-        </p:txBody>
-      </p:sp>
-      <p:sp>
-        <p:nvSpPr>
-          <p:cNvPr id="48" name="TextBox 47"/>
+              <a:rPr lang="en-US" b="1" dirty="0" smtClean="0"/>
+              <a:t>41%</a:t>
+            </a:r>
+            <a:endParaRPr lang="en-US" b="1" dirty="0"/>
+          </a:p>
+        </p:txBody>
+      </p:sp>
+      <p:sp>
+        <p:nvSpPr>
+          <p:cNvPr id="32" name="TextBox 31"/>
           <p:cNvSpPr txBox="1"/>
           <p:nvPr/>
         </p:nvSpPr>
         <p:spPr>
           <a:xfrm>
-            <a:off x="7780978" y="4482374"/>
-            <a:ext cx="3202294" cy="369332"/>
+            <a:off x="3333954" y="3920719"/>
+            <a:ext cx="2339534" cy="369332"/>
           </a:xfrm>
           <a:prstGeom prst="rect">
             <a:avLst/>
@@ -4576,24 +5603,25 @@
           </a:bodyPr>
           <a:lstStyle/>
           <a:p>
-            <a:r>
-              <a:rPr lang="en-US" dirty="0"/>
-              <a:t>Lost in Final Four </a:t>
-            </a:r>
-            <a:endParaRPr lang="en-US" dirty="0"/>
-          </a:p>
-        </p:txBody>
-      </p:sp>
-      <p:sp>
-        <p:nvSpPr>
-          <p:cNvPr id="5" name="TextBox 4"/>
+            <a:pPr algn="ctr"/>
+            <a:r>
+              <a:rPr lang="en-US" b="1" dirty="0" smtClean="0"/>
+              <a:t>75%</a:t>
+            </a:r>
+            <a:endParaRPr lang="en-US" b="1" dirty="0"/>
+          </a:p>
+        </p:txBody>
+      </p:sp>
+      <p:sp>
+        <p:nvSpPr>
+          <p:cNvPr id="34" name="TextBox 33"/>
           <p:cNvSpPr txBox="1"/>
           <p:nvPr/>
         </p:nvSpPr>
         <p:spPr>
           <a:xfrm>
-            <a:off x="1096883" y="5368072"/>
-            <a:ext cx="10059573" cy="553998"/>
+            <a:off x="5677636" y="2780726"/>
+            <a:ext cx="2043849" cy="369332"/>
           </a:xfrm>
           <a:prstGeom prst="rect">
             <a:avLst/>
@@ -4608,23 +5636,203 @@
           <a:p>
             <a:pPr algn="ctr"/>
             <a:r>
-              <a:rPr lang="en-US" sz="3000" dirty="0" smtClean="0"/>
-              <a:t>Championship simulation:        over        (65%)</a:t>
-            </a:r>
-            <a:endParaRPr lang="en-US" sz="3000" dirty="0"/>
+              <a:rPr lang="en-US" dirty="0" smtClean="0">
+                <a:solidFill>
+                  <a:schemeClr val="tx1">
+                    <a:lumMod val="50000"/>
+                    <a:lumOff val="50000"/>
+                  </a:schemeClr>
+                </a:solidFill>
+              </a:rPr>
+              <a:t>45%</a:t>
+            </a:r>
+            <a:endParaRPr lang="en-US" dirty="0">
+              <a:solidFill>
+                <a:schemeClr val="tx1">
+                  <a:lumMod val="50000"/>
+                  <a:lumOff val="50000"/>
+                </a:schemeClr>
+              </a:solidFill>
+            </a:endParaRPr>
+          </a:p>
+        </p:txBody>
+      </p:sp>
+      <p:sp>
+        <p:nvSpPr>
+          <p:cNvPr id="35" name="TextBox 34"/>
+          <p:cNvSpPr txBox="1"/>
+          <p:nvPr/>
+        </p:nvSpPr>
+        <p:spPr>
+          <a:xfrm>
+            <a:off x="5677636" y="3357938"/>
+            <a:ext cx="2043849" cy="369332"/>
+          </a:xfrm>
+          <a:prstGeom prst="rect">
+            <a:avLst/>
+          </a:prstGeom>
+          <a:noFill/>
+        </p:spPr>
+        <p:txBody>
+          <a:bodyPr wrap="square" rtlCol="0">
+            <a:spAutoFit/>
+          </a:bodyPr>
+          <a:lstStyle/>
+          <a:p>
+            <a:pPr algn="ctr"/>
+            <a:r>
+              <a:rPr lang="en-US" dirty="0" smtClean="0">
+                <a:solidFill>
+                  <a:schemeClr val="tx1">
+                    <a:lumMod val="50000"/>
+                    <a:lumOff val="50000"/>
+                  </a:schemeClr>
+                </a:solidFill>
+              </a:rPr>
+              <a:t>29%</a:t>
+            </a:r>
+            <a:endParaRPr lang="en-US" dirty="0">
+              <a:solidFill>
+                <a:schemeClr val="tx1">
+                  <a:lumMod val="50000"/>
+                  <a:lumOff val="50000"/>
+                </a:schemeClr>
+              </a:solidFill>
+            </a:endParaRPr>
+          </a:p>
+        </p:txBody>
+      </p:sp>
+      <p:sp>
+        <p:nvSpPr>
+          <p:cNvPr id="38" name="TextBox 37"/>
+          <p:cNvSpPr txBox="1"/>
+          <p:nvPr/>
+        </p:nvSpPr>
+        <p:spPr>
+          <a:xfrm>
+            <a:off x="5677636" y="3920719"/>
+            <a:ext cx="2043849" cy="369332"/>
+          </a:xfrm>
+          <a:prstGeom prst="rect">
+            <a:avLst/>
+          </a:prstGeom>
+          <a:noFill/>
+        </p:spPr>
+        <p:txBody>
+          <a:bodyPr wrap="square" rtlCol="0">
+            <a:spAutoFit/>
+          </a:bodyPr>
+          <a:lstStyle/>
+          <a:p>
+            <a:pPr algn="ctr"/>
+            <a:r>
+              <a:rPr lang="en-US" b="1" dirty="0" smtClean="0"/>
+              <a:t>23%</a:t>
+            </a:r>
+            <a:endParaRPr lang="en-US" b="1" dirty="0"/>
+          </a:p>
+        </p:txBody>
+      </p:sp>
+      <p:sp>
+        <p:nvSpPr>
+          <p:cNvPr id="40" name="TextBox 39"/>
+          <p:cNvSpPr txBox="1"/>
+          <p:nvPr/>
+        </p:nvSpPr>
+        <p:spPr>
+          <a:xfrm>
+            <a:off x="7780978" y="2779599"/>
+            <a:ext cx="3202294" cy="369332"/>
+          </a:xfrm>
+          <a:prstGeom prst="rect">
+            <a:avLst/>
+          </a:prstGeom>
+          <a:noFill/>
+        </p:spPr>
+        <p:txBody>
+          <a:bodyPr wrap="square" rtlCol="0">
+            <a:spAutoFit/>
+          </a:bodyPr>
+          <a:lstStyle/>
+          <a:p>
+            <a:r>
+              <a:rPr lang="en-US" dirty="0" smtClean="0"/>
+              <a:t>Lost in Final Four </a:t>
+            </a:r>
+            <a:endParaRPr lang="en-US" dirty="0"/>
+          </a:p>
+        </p:txBody>
+      </p:sp>
+      <p:sp>
+        <p:nvSpPr>
+          <p:cNvPr id="41" name="TextBox 40"/>
+          <p:cNvSpPr txBox="1"/>
+          <p:nvPr/>
+        </p:nvSpPr>
+        <p:spPr>
+          <a:xfrm>
+            <a:off x="7780978" y="3356811"/>
+            <a:ext cx="3202294" cy="369332"/>
+          </a:xfrm>
+          <a:prstGeom prst="rect">
+            <a:avLst/>
+          </a:prstGeom>
+          <a:noFill/>
+        </p:spPr>
+        <p:txBody>
+          <a:bodyPr wrap="square" rtlCol="0">
+            <a:spAutoFit/>
+          </a:bodyPr>
+          <a:lstStyle/>
+          <a:p>
+            <a:r>
+              <a:rPr lang="en-US" dirty="0" smtClean="0"/>
+              <a:t>Lost in Championship Game</a:t>
+            </a:r>
+            <a:endParaRPr lang="en-US" dirty="0"/>
+          </a:p>
+        </p:txBody>
+      </p:sp>
+      <p:sp>
+        <p:nvSpPr>
+          <p:cNvPr id="45" name="TextBox 44"/>
+          <p:cNvSpPr txBox="1"/>
+          <p:nvPr/>
+        </p:nvSpPr>
+        <p:spPr>
+          <a:xfrm>
+            <a:off x="7780978" y="3919592"/>
+            <a:ext cx="3202294" cy="369332"/>
+          </a:xfrm>
+          <a:prstGeom prst="rect">
+            <a:avLst/>
+          </a:prstGeom>
+          <a:noFill/>
+        </p:spPr>
+        <p:txBody>
+          <a:bodyPr wrap="square" rtlCol="0">
+            <a:spAutoFit/>
+          </a:bodyPr>
+          <a:lstStyle/>
+          <a:p>
+            <a:r>
+              <a:rPr lang="en-US" dirty="0" smtClean="0"/>
+              <a:t>Won Championship</a:t>
+            </a:r>
+            <a:endParaRPr lang="en-US" dirty="0"/>
           </a:p>
         </p:txBody>
       </p:sp>
       <p:pic>
         <p:nvPicPr>
-          <p:cNvPr id="49" name="Picture 48" descr="Wisconsin.pdf"/>
+          <p:cNvPr id="4" name="Picture 3" descr="Michigan State.pdf"/>
           <p:cNvPicPr>
             <a:picLocks noChangeAspect="1"/>
           </p:cNvPicPr>
           <p:nvPr/>
         </p:nvPicPr>
         <p:blipFill>
-          <a:blip r:embed="rId3">
+          <a:blip r:embed="rId6">
             <a:extLst>
               <a:ext uri="{28A0092B-C50C-407E-A947-70E740481C1C}">
                 <a14:useLocalDpi xmlns:a14="http://schemas.microsoft.com/office/drawing/2010/main" val="0"/>
@@ -4637,7 +5845,175 @@
         </p:blipFill>
         <p:spPr>
           <a:xfrm>
-            <a:off x="6788094" y="5427315"/>
+            <a:off x="2202935" y="4410682"/>
+            <a:ext cx="433552" cy="502920"/>
+          </a:xfrm>
+          <a:prstGeom prst="rect">
+            <a:avLst/>
+          </a:prstGeom>
+        </p:spPr>
+      </p:pic>
+      <p:sp>
+        <p:nvSpPr>
+          <p:cNvPr id="46" name="TextBox 45"/>
+          <p:cNvSpPr txBox="1"/>
+          <p:nvPr/>
+        </p:nvSpPr>
+        <p:spPr>
+          <a:xfrm>
+            <a:off x="3333954" y="4483501"/>
+            <a:ext cx="2339534" cy="369332"/>
+          </a:xfrm>
+          <a:prstGeom prst="rect">
+            <a:avLst/>
+          </a:prstGeom>
+          <a:noFill/>
+        </p:spPr>
+        <p:txBody>
+          <a:bodyPr wrap="square" rtlCol="0">
+            <a:spAutoFit/>
+          </a:bodyPr>
+          <a:lstStyle/>
+          <a:p>
+            <a:pPr algn="ctr"/>
+            <a:r>
+              <a:rPr lang="en-US" dirty="0" smtClean="0">
+                <a:solidFill>
+                  <a:srgbClr val="7F7F7F"/>
+                </a:solidFill>
+              </a:rPr>
+              <a:t>25%</a:t>
+            </a:r>
+            <a:endParaRPr lang="en-US" dirty="0">
+              <a:solidFill>
+                <a:srgbClr val="7F7F7F"/>
+              </a:solidFill>
+            </a:endParaRPr>
+          </a:p>
+        </p:txBody>
+      </p:sp>
+      <p:sp>
+        <p:nvSpPr>
+          <p:cNvPr id="47" name="TextBox 46"/>
+          <p:cNvSpPr txBox="1"/>
+          <p:nvPr/>
+        </p:nvSpPr>
+        <p:spPr>
+          <a:xfrm>
+            <a:off x="5677636" y="4483501"/>
+            <a:ext cx="2043849" cy="369332"/>
+          </a:xfrm>
+          <a:prstGeom prst="rect">
+            <a:avLst/>
+          </a:prstGeom>
+          <a:noFill/>
+        </p:spPr>
+        <p:txBody>
+          <a:bodyPr wrap="square" rtlCol="0">
+            <a:spAutoFit/>
+          </a:bodyPr>
+          <a:lstStyle/>
+          <a:p>
+            <a:pPr algn="ctr"/>
+            <a:r>
+              <a:rPr lang="en-US" dirty="0" smtClean="0">
+                <a:solidFill>
+                  <a:srgbClr val="7F7F7F"/>
+                </a:solidFill>
+              </a:rPr>
+              <a:t>3.2%</a:t>
+            </a:r>
+            <a:endParaRPr lang="en-US" dirty="0">
+              <a:solidFill>
+                <a:srgbClr val="7F7F7F"/>
+              </a:solidFill>
+            </a:endParaRPr>
+          </a:p>
+        </p:txBody>
+      </p:sp>
+      <p:sp>
+        <p:nvSpPr>
+          <p:cNvPr id="48" name="TextBox 47"/>
+          <p:cNvSpPr txBox="1"/>
+          <p:nvPr/>
+        </p:nvSpPr>
+        <p:spPr>
+          <a:xfrm>
+            <a:off x="7780978" y="4482374"/>
+            <a:ext cx="3202294" cy="369332"/>
+          </a:xfrm>
+          <a:prstGeom prst="rect">
+            <a:avLst/>
+          </a:prstGeom>
+          <a:noFill/>
+        </p:spPr>
+        <p:txBody>
+          <a:bodyPr wrap="square" rtlCol="0">
+            <a:spAutoFit/>
+          </a:bodyPr>
+          <a:lstStyle/>
+          <a:p>
+            <a:r>
+              <a:rPr lang="en-US" dirty="0"/>
+              <a:t>Lost in Final Four </a:t>
+            </a:r>
+          </a:p>
+        </p:txBody>
+      </p:sp>
+      <p:sp>
+        <p:nvSpPr>
+          <p:cNvPr id="5" name="TextBox 4"/>
+          <p:cNvSpPr txBox="1"/>
+          <p:nvPr/>
+        </p:nvSpPr>
+        <p:spPr>
+          <a:xfrm>
+            <a:off x="1096883" y="5368072"/>
+            <a:ext cx="10059573" cy="553998"/>
+          </a:xfrm>
+          <a:prstGeom prst="rect">
+            <a:avLst/>
+          </a:prstGeom>
+          <a:noFill/>
+        </p:spPr>
+        <p:txBody>
+          <a:bodyPr wrap="square" rtlCol="0">
+            <a:spAutoFit/>
+          </a:bodyPr>
+          <a:lstStyle/>
+          <a:p>
+            <a:pPr algn="ctr"/>
+            <a:r>
+              <a:rPr lang="en-US" sz="3000" dirty="0" smtClean="0"/>
+              <a:t>Championship simulation:        over        (65%)</a:t>
+            </a:r>
+            <a:endParaRPr lang="en-US" sz="3000" dirty="0"/>
+          </a:p>
+        </p:txBody>
+      </p:sp>
+      <p:pic>
+        <p:nvPicPr>
+          <p:cNvPr id="49" name="Picture 48" descr="Wisconsin.pdf"/>
+          <p:cNvPicPr>
+            <a:picLocks noChangeAspect="1"/>
+          </p:cNvPicPr>
+          <p:nvPr/>
+        </p:nvPicPr>
+        <p:blipFill>
+          <a:blip r:embed="rId4">
+            <a:extLst>
+              <a:ext uri="{28A0092B-C50C-407E-A947-70E740481C1C}">
+                <a14:useLocalDpi xmlns:a14="http://schemas.microsoft.com/office/drawing/2010/main" val="0"/>
+              </a:ext>
+            </a:extLst>
+          </a:blip>
+          <a:stretch>
+            <a:fillRect/>
+          </a:stretch>
+        </p:blipFill>
+        <p:spPr>
+          <a:xfrm>
+            <a:off x="6763432" y="5427315"/>
             <a:ext cx="529389" cy="502920"/>
           </a:xfrm>
           <a:prstGeom prst="rect">
@@ -4654,7 +6030,7 @@
           <p:nvPr/>
         </p:nvPicPr>
         <p:blipFill>
-          <a:blip r:embed="rId4">
+          <a:blip r:embed="rId5">
             <a:extLst>
               <a:ext uri="{28A0092B-C50C-407E-A947-70E740481C1C}">
                 <a14:useLocalDpi xmlns:a14="http://schemas.microsoft.com/office/drawing/2010/main" val="0"/>
@@ -4768,11 +6144,7 @@
             </a:pPr>
             <a:r>
               <a:rPr lang="en-US" sz="3200" dirty="0" smtClean="0"/>
-              <a:t>Goal: use Bayesian logisti</a:t>
-            </a:r>
-            <a:r>
-              <a:rPr lang="en-US" sz="3200" dirty="0" smtClean="0"/>
-              <a:t>c regression to predict game outcomes.</a:t>
+              <a:t>Goal: use Bayesian logistic regression to predict game outcomes.</a:t>
             </a:r>
           </a:p>
           <a:p>
@@ -4807,6 +6179,14 @@
   <p:clrMapOvr>
     <a:masterClrMapping/>
   </p:clrMapOvr>
+  <mc:AlternateContent xmlns:mc="http://schemas.openxmlformats.org/markup-compatibility/2006">
+    <mc:Choice xmlns:p14="http://schemas.microsoft.com/office/powerpoint/2010/main" Requires="p14">
+      <p:transition spd="slow" p14:dur="2000" advTm="19502"/>
+    </mc:Choice>
+    <mc:Fallback>
+      <p:transition xmlns:p14="http://schemas.microsoft.com/office/powerpoint/2010/main" spd="slow" advTm="19502"/>
+    </mc:Fallback>
+  </mc:AlternateContent>
   <p:timing>
     <p:tnLst>
       <p:par>
@@ -4934,6 +6314,14 @@
   <p:clrMapOvr>
     <a:masterClrMapping/>
   </p:clrMapOvr>
+  <mc:AlternateContent xmlns:mc="http://schemas.openxmlformats.org/markup-compatibility/2006">
+    <mc:Choice xmlns:p14="http://schemas.microsoft.com/office/powerpoint/2010/main" Requires="p14">
+      <p:transition spd="slow" p14:dur="2000" advTm="13405"/>
+    </mc:Choice>
+    <mc:Fallback>
+      <p:transition xmlns:p14="http://schemas.microsoft.com/office/powerpoint/2010/main" spd="slow" advTm="13405"/>
+    </mc:Fallback>
+  </mc:AlternateContent>
   <p:timing>
     <p:tnLst>
       <p:par>
@@ -5005,13 +6393,8 @@
             </a:pPr>
             <a:r>
               <a:rPr lang="en-US" dirty="0" smtClean="0"/>
-              <a:t>Ranked predictors by relative importance </a:t>
-            </a:r>
-            <a:r>
-              <a:rPr lang="en-US" dirty="0" smtClean="0"/>
-              <a:t>using Random Forests</a:t>
-            </a:r>
-            <a:endParaRPr lang="en-US" dirty="0" smtClean="0"/>
+              <a:t>Ranked predictors by relative importance using Random Forests</a:t>
+            </a:r>
           </a:p>
           <a:p>
             <a:pPr marL="457200" indent="-457200">
@@ -5052,36 +6435,6 @@
       <p:pic>
         <p:nvPicPr>
           <p:cNvPr id="4" name="Picture 3" descr="RF Importance.png"/>
-          <p:cNvPicPr>
-            <a:picLocks noChangeAspect="1"/>
-          </p:cNvPicPr>
-          <p:nvPr/>
-        </p:nvPicPr>
-        <p:blipFill>
-          <a:blip r:embed="rId2">
-            <a:extLst>
-              <a:ext uri="{28A0092B-C50C-407E-A947-70E740481C1C}">
-                <a14:useLocalDpi xmlns:a14="http://schemas.microsoft.com/office/drawing/2010/main" val="0"/>
-              </a:ext>
-            </a:extLst>
-          </a:blip>
-          <a:stretch>
-            <a:fillRect/>
-          </a:stretch>
-        </p:blipFill>
-        <p:spPr>
-          <a:xfrm>
-            <a:off x="1092200" y="3340100"/>
-            <a:ext cx="4389120" cy="2926080"/>
-          </a:xfrm>
-          <a:prstGeom prst="rect">
-            <a:avLst/>
-          </a:prstGeom>
-        </p:spPr>
-      </p:pic>
-      <p:pic>
-        <p:nvPicPr>
-          <p:cNvPr id="5" name="Picture 4"/>
           <p:cNvPicPr>
             <a:picLocks noChangeAspect="1"/>
           </p:cNvPicPr>
@@ -5101,6 +6454,36 @@
         </p:blipFill>
         <p:spPr>
           <a:xfrm>
+            <a:off x="1092200" y="3340100"/>
+            <a:ext cx="4389120" cy="2926080"/>
+          </a:xfrm>
+          <a:prstGeom prst="rect">
+            <a:avLst/>
+          </a:prstGeom>
+        </p:spPr>
+      </p:pic>
+      <p:pic>
+        <p:nvPicPr>
+          <p:cNvPr id="5" name="Picture 4"/>
+          <p:cNvPicPr>
+            <a:picLocks noChangeAspect="1"/>
+          </p:cNvPicPr>
+          <p:nvPr/>
+        </p:nvPicPr>
+        <p:blipFill>
+          <a:blip r:embed="rId4">
+            <a:extLst>
+              <a:ext uri="{28A0092B-C50C-407E-A947-70E740481C1C}">
+                <a14:useLocalDpi xmlns:a14="http://schemas.microsoft.com/office/drawing/2010/main" val="0"/>
+              </a:ext>
+            </a:extLst>
+          </a:blip>
+          <a:stretch>
+            <a:fillRect/>
+          </a:stretch>
+        </p:blipFill>
+        <p:spPr>
+          <a:xfrm>
             <a:off x="6235700" y="3340100"/>
             <a:ext cx="4389120" cy="2926080"/>
           </a:xfrm>
@@ -5119,6 +6502,14 @@
   <p:clrMapOvr>
     <a:masterClrMapping/>
   </p:clrMapOvr>
+  <mc:AlternateContent xmlns:mc="http://schemas.openxmlformats.org/markup-compatibility/2006">
+    <mc:Choice xmlns:p14="http://schemas.microsoft.com/office/powerpoint/2010/main" Requires="p14">
+      <p:transition spd="slow" p14:dur="2000" advTm="18428"/>
+    </mc:Choice>
+    <mc:Fallback>
+      <p:transition xmlns:p14="http://schemas.microsoft.com/office/powerpoint/2010/main" spd="slow" advTm="18428"/>
+    </mc:Fallback>
+  </mc:AlternateContent>
   <p:timing>
     <p:tnLst>
       <p:par>
@@ -5155,7 +6546,7 @@
           <p:nvPr/>
         </p:nvPicPr>
         <p:blipFill>
-          <a:blip r:embed="rId2"/>
+          <a:blip r:embed="rId3"/>
           <a:stretch>
             <a:fillRect/>
           </a:stretch>
@@ -5179,7 +6570,7 @@
           <p:nvPr/>
         </p:nvPicPr>
         <p:blipFill>
-          <a:blip r:embed="rId3"/>
+          <a:blip r:embed="rId4"/>
           <a:stretch>
             <a:fillRect/>
           </a:stretch>
@@ -5749,7 +7140,7 @@
             <p:nvPr/>
           </p:nvPicPr>
           <p:blipFill>
-            <a:blip r:embed="rId2">
+            <a:blip r:embed="rId3">
               <a:extLst>
                 <a:ext uri="{28A0092B-C50C-407E-A947-70E740481C1C}">
                   <a14:useLocalDpi xmlns:a14="http://schemas.microsoft.com/office/drawing/2010/main" val="0"/>
@@ -5779,7 +7170,7 @@
             <p:nvPr/>
           </p:nvPicPr>
           <p:blipFill>
-            <a:blip r:embed="rId3">
+            <a:blip r:embed="rId4">
               <a:extLst>
                 <a:ext uri="{28A0092B-C50C-407E-A947-70E740481C1C}">
                   <a14:useLocalDpi xmlns:a14="http://schemas.microsoft.com/office/drawing/2010/main" val="0"/>
@@ -5809,7 +7200,7 @@
             <p:nvPr/>
           </p:nvPicPr>
           <p:blipFill>
-            <a:blip r:embed="rId4">
+            <a:blip r:embed="rId5">
               <a:extLst>
                 <a:ext uri="{28A0092B-C50C-407E-A947-70E740481C1C}">
                   <a14:useLocalDpi xmlns:a14="http://schemas.microsoft.com/office/drawing/2010/main" val="0"/>
@@ -5839,7 +7230,7 @@
             <p:nvPr/>
           </p:nvPicPr>
           <p:blipFill>
-            <a:blip r:embed="rId5">
+            <a:blip r:embed="rId6">
               <a:extLst>
                 <a:ext uri="{28A0092B-C50C-407E-A947-70E740481C1C}">
                   <a14:useLocalDpi xmlns:a14="http://schemas.microsoft.com/office/drawing/2010/main" val="0"/>
@@ -6605,7 +7996,7 @@
             <p:nvPr/>
           </p:nvPicPr>
           <p:blipFill>
-            <a:blip r:embed="rId2">
+            <a:blip r:embed="rId3">
               <a:extLst>
                 <a:ext uri="{28A0092B-C50C-407E-A947-70E740481C1C}">
                   <a14:useLocalDpi xmlns:a14="http://schemas.microsoft.com/office/drawing/2010/main" val="0"/>
@@ -6635,7 +8026,7 @@
             <p:nvPr/>
           </p:nvPicPr>
           <p:blipFill>
-            <a:blip r:embed="rId3">
+            <a:blip r:embed="rId4">
               <a:extLst>
                 <a:ext uri="{28A0092B-C50C-407E-A947-70E740481C1C}">
                   <a14:useLocalDpi xmlns:a14="http://schemas.microsoft.com/office/drawing/2010/main" val="0"/>
@@ -7342,7 +8733,6 @@
               <a:rPr lang="en-US" sz="3000" dirty="0" smtClean="0"/>
               <a:t>Also simulated the real-life Final Four and championship game.</a:t>
             </a:r>
-            <a:endParaRPr lang="en-US" sz="3000" dirty="0" smtClean="0"/>
           </a:p>
           <a:p>
             <a:pPr>
@@ -7362,7 +8752,7 @@
           <p:nvPr/>
         </p:nvPicPr>
         <p:blipFill>
-          <a:blip r:embed="rId2"/>
+          <a:blip r:embed="rId3"/>
           <a:stretch>
             <a:fillRect/>
           </a:stretch>
@@ -7603,7 +8993,7 @@
           <p:nvPr/>
         </p:nvPicPr>
         <p:blipFill>
-          <a:blip r:embed="rId2" cstate="print">
+          <a:blip r:embed="rId3" cstate="print">
             <a:extLst>
               <a:ext uri="{28A0092B-C50C-407E-A947-70E740481C1C}">
                 <a14:useLocalDpi xmlns:a14="http://schemas.microsoft.com/office/drawing/2010/main" val="0"/>
@@ -7627,36 +9017,6 @@
       <p:pic>
         <p:nvPicPr>
           <p:cNvPr id="22" name="Picture 21" descr="Wisconsin.pdf"/>
-          <p:cNvPicPr>
-            <a:picLocks noChangeAspect="1"/>
-          </p:cNvPicPr>
-          <p:nvPr/>
-        </p:nvPicPr>
-        <p:blipFill>
-          <a:blip r:embed="rId3">
-            <a:extLst>
-              <a:ext uri="{28A0092B-C50C-407E-A947-70E740481C1C}">
-                <a14:useLocalDpi xmlns:a14="http://schemas.microsoft.com/office/drawing/2010/main" val="0"/>
-              </a:ext>
-            </a:extLst>
-          </a:blip>
-          <a:stretch>
-            <a:fillRect/>
-          </a:stretch>
-        </p:blipFill>
-        <p:spPr>
-          <a:xfrm>
-            <a:off x="2378021" y="3052649"/>
-            <a:ext cx="529389" cy="502920"/>
-          </a:xfrm>
-          <a:prstGeom prst="rect">
-            <a:avLst/>
-          </a:prstGeom>
-        </p:spPr>
-      </p:pic>
-      <p:pic>
-        <p:nvPicPr>
-          <p:cNvPr id="23" name="Picture 22" descr="Villanova.pdf"/>
           <p:cNvPicPr>
             <a:picLocks noChangeAspect="1"/>
           </p:cNvPicPr>
@@ -7676,8 +9036,8 @@
         </p:blipFill>
         <p:spPr>
           <a:xfrm>
-            <a:off x="2385695" y="3645380"/>
-            <a:ext cx="514041" cy="457200"/>
+            <a:off x="2378021" y="3052649"/>
+            <a:ext cx="529389" cy="502920"/>
           </a:xfrm>
           <a:prstGeom prst="rect">
             <a:avLst/>
@@ -7686,7 +9046,7 @@
       </p:pic>
       <p:pic>
         <p:nvPicPr>
-          <p:cNvPr id="24" name="Picture 23" descr="Arizona.pdf"/>
+          <p:cNvPr id="23" name="Picture 22" descr="Villanova.pdf"/>
           <p:cNvPicPr>
             <a:picLocks noChangeAspect="1"/>
           </p:cNvPicPr>
@@ -7706,8 +9066,8 @@
         </p:blipFill>
         <p:spPr>
           <a:xfrm>
-            <a:off x="2370572" y="4216825"/>
-            <a:ext cx="544286" cy="502920"/>
+            <a:off x="2385695" y="3645380"/>
+            <a:ext cx="514041" cy="457200"/>
           </a:xfrm>
           <a:prstGeom prst="rect">
             <a:avLst/>
@@ -7716,7 +9076,7 @@
       </p:pic>
       <p:pic>
         <p:nvPicPr>
-          <p:cNvPr id="25" name="Picture 24" descr="Duke.pdf"/>
+          <p:cNvPr id="24" name="Picture 23" descr="Arizona.pdf"/>
           <p:cNvPicPr>
             <a:picLocks noChangeAspect="1"/>
           </p:cNvPicPr>
@@ -7736,6 +9096,36 @@
         </p:blipFill>
         <p:spPr>
           <a:xfrm>
+            <a:off x="2370572" y="4216825"/>
+            <a:ext cx="544286" cy="502920"/>
+          </a:xfrm>
+          <a:prstGeom prst="rect">
+            <a:avLst/>
+          </a:prstGeom>
+        </p:spPr>
+      </p:pic>
+      <p:pic>
+        <p:nvPicPr>
+          <p:cNvPr id="25" name="Picture 24" descr="Duke.pdf"/>
+          <p:cNvPicPr>
+            <a:picLocks noChangeAspect="1"/>
+          </p:cNvPicPr>
+          <p:nvPr/>
+        </p:nvPicPr>
+        <p:blipFill>
+          <a:blip r:embed="rId7">
+            <a:extLst>
+              <a:ext uri="{28A0092B-C50C-407E-A947-70E740481C1C}">
+                <a14:useLocalDpi xmlns:a14="http://schemas.microsoft.com/office/drawing/2010/main" val="0"/>
+              </a:ext>
+            </a:extLst>
+          </a:blip>
+          <a:stretch>
+            <a:fillRect/>
+          </a:stretch>
+        </p:blipFill>
+        <p:spPr>
+          <a:xfrm>
             <a:off x="2373774" y="4835165"/>
             <a:ext cx="537882" cy="457200"/>
           </a:xfrm>
@@ -7753,7 +9143,7 @@
           <p:nvPr/>
         </p:nvPicPr>
         <p:blipFill>
-          <a:blip r:embed="rId7">
+          <a:blip r:embed="rId8">
             <a:extLst>
               <a:ext uri="{28A0092B-C50C-407E-A947-70E740481C1C}">
                 <a14:useLocalDpi xmlns:a14="http://schemas.microsoft.com/office/drawing/2010/main" val="0"/>
@@ -8739,4 +10129,324 @@
     </a:ext>
   </a:extLst>
 </a:theme>
+</file>
+
+<file path=ppt/theme/theme2.xml><?xml version="1.0" encoding="utf-8"?>
+<a:theme xmlns:a="http://schemas.openxmlformats.org/drawingml/2006/main" name="Office Theme">
+  <a:themeElements>
+    <a:clrScheme name="Office">
+      <a:dk1>
+        <a:sysClr val="windowText" lastClr="000000"/>
+      </a:dk1>
+      <a:lt1>
+        <a:sysClr val="window" lastClr="FFFFFF"/>
+      </a:lt1>
+      <a:dk2>
+        <a:srgbClr val="1F497D"/>
+      </a:dk2>
+      <a:lt2>
+        <a:srgbClr val="EEECE1"/>
+      </a:lt2>
+      <a:accent1>
+        <a:srgbClr val="4F81BD"/>
+      </a:accent1>
+      <a:accent2>
+        <a:srgbClr val="C0504D"/>
+      </a:accent2>
+      <a:accent3>
+        <a:srgbClr val="9BBB59"/>
+      </a:accent3>
+      <a:accent4>
+        <a:srgbClr val="8064A2"/>
+      </a:accent4>
+      <a:accent5>
+        <a:srgbClr val="4BACC6"/>
+      </a:accent5>
+      <a:accent6>
+        <a:srgbClr val="F79646"/>
+      </a:accent6>
+      <a:hlink>
+        <a:srgbClr val="0000FF"/>
+      </a:hlink>
+      <a:folHlink>
+        <a:srgbClr val="800080"/>
+      </a:folHlink>
+    </a:clrScheme>
+    <a:fontScheme name="Office">
+      <a:majorFont>
+        <a:latin typeface="Calibri"/>
+        <a:ea typeface=""/>
+        <a:cs typeface=""/>
+        <a:font script="Jpan" typeface="ＭＳ Ｐゴシック"/>
+        <a:font script="Hang" typeface="맑은 고딕"/>
+        <a:font script="Hans" typeface="宋体"/>
+        <a:font script="Hant" typeface="新細明體"/>
+        <a:font script="Arab" typeface="Times New Roman"/>
+        <a:font script="Hebr" typeface="Times New Roman"/>
+        <a:font script="Thai" typeface="Angsana New"/>
+        <a:font script="Ethi" typeface="Nyala"/>
+        <a:font script="Beng" typeface="Vrinda"/>
+        <a:font script="Gujr" typeface="Shruti"/>
+        <a:font script="Khmr" typeface="MoolBoran"/>
+        <a:font script="Knda" typeface="Tunga"/>
+        <a:font script="Guru" typeface="Raavi"/>
+        <a:font script="Cans" typeface="Euphemia"/>
+        <a:font script="Cher" typeface="Plantagenet Cherokee"/>
+        <a:font script="Yiii" typeface="Microsoft Yi Baiti"/>
+        <a:font script="Tibt" typeface="Microsoft Himalaya"/>
+        <a:font script="Thaa" typeface="MV Boli"/>
+        <a:font script="Deva" typeface="Mangal"/>
+        <a:font script="Telu" typeface="Gautami"/>
+        <a:font script="Taml" typeface="Latha"/>
+        <a:font script="Syrc" typeface="Estrangelo Edessa"/>
+        <a:font script="Orya" typeface="Kalinga"/>
+        <a:font script="Mlym" typeface="Kartika"/>
+        <a:font script="Laoo" typeface="DokChampa"/>
+        <a:font script="Sinh" typeface="Iskoola Pota"/>
+        <a:font script="Mong" typeface="Mongolian Baiti"/>
+        <a:font script="Viet" typeface="Times New Roman"/>
+        <a:font script="Uigh" typeface="Microsoft Uighur"/>
+        <a:font script="Geor" typeface="Sylfaen"/>
+      </a:majorFont>
+      <a:minorFont>
+        <a:latin typeface="Calibri"/>
+        <a:ea typeface=""/>
+        <a:cs typeface=""/>
+        <a:font script="Jpan" typeface="ＭＳ Ｐゴシック"/>
+        <a:font script="Hang" typeface="맑은 고딕"/>
+        <a:font script="Hans" typeface="宋体"/>
+        <a:font script="Hant" typeface="新細明體"/>
+        <a:font script="Arab" typeface="Arial"/>
+        <a:font script="Hebr" typeface="Arial"/>
+        <a:font script="Thai" typeface="Cordia New"/>
+        <a:font script="Ethi" typeface="Nyala"/>
+        <a:font script="Beng" typeface="Vrinda"/>
+        <a:font script="Gujr" typeface="Shruti"/>
+        <a:font script="Khmr" typeface="DaunPenh"/>
+        <a:font script="Knda" typeface="Tunga"/>
+        <a:font script="Guru" typeface="Raavi"/>
+        <a:font script="Cans" typeface="Euphemia"/>
+        <a:font script="Cher" typeface="Plantagenet Cherokee"/>
+        <a:font script="Yiii" typeface="Microsoft Yi Baiti"/>
+        <a:font script="Tibt" typeface="Microsoft Himalaya"/>
+        <a:font script="Thaa" typeface="MV Boli"/>
+        <a:font script="Deva" typeface="Mangal"/>
+        <a:font script="Telu" typeface="Gautami"/>
+        <a:font script="Taml" typeface="Latha"/>
+        <a:font script="Syrc" typeface="Estrangelo Edessa"/>
+        <a:font script="Orya" typeface="Kalinga"/>
+        <a:font script="Mlym" typeface="Kartika"/>
+        <a:font script="Laoo" typeface="DokChampa"/>
+        <a:font script="Sinh" typeface="Iskoola Pota"/>
+        <a:font script="Mong" typeface="Mongolian Baiti"/>
+        <a:font script="Viet" typeface="Arial"/>
+        <a:font script="Uigh" typeface="Microsoft Uighur"/>
+        <a:font script="Geor" typeface="Sylfaen"/>
+      </a:minorFont>
+    </a:fontScheme>
+    <a:fmtScheme name="Office">
+      <a:fillStyleLst>
+        <a:solidFill>
+          <a:schemeClr val="phClr"/>
+        </a:solidFill>
+        <a:gradFill rotWithShape="1">
+          <a:gsLst>
+            <a:gs pos="0">
+              <a:schemeClr val="phClr">
+                <a:tint val="50000"/>
+                <a:satMod val="300000"/>
+              </a:schemeClr>
+            </a:gs>
+            <a:gs pos="35000">
+              <a:schemeClr val="phClr">
+                <a:tint val="37000"/>
+                <a:satMod val="300000"/>
+              </a:schemeClr>
+            </a:gs>
+            <a:gs pos="100000">
+              <a:schemeClr val="phClr">
+                <a:tint val="15000"/>
+                <a:satMod val="350000"/>
+              </a:schemeClr>
+            </a:gs>
+          </a:gsLst>
+          <a:lin ang="16200000" scaled="1"/>
+        </a:gradFill>
+        <a:gradFill rotWithShape="1">
+          <a:gsLst>
+            <a:gs pos="0">
+              <a:schemeClr val="phClr">
+                <a:tint val="100000"/>
+                <a:shade val="100000"/>
+                <a:satMod val="130000"/>
+              </a:schemeClr>
+            </a:gs>
+            <a:gs pos="100000">
+              <a:schemeClr val="phClr">
+                <a:tint val="50000"/>
+                <a:shade val="100000"/>
+                <a:satMod val="350000"/>
+              </a:schemeClr>
+            </a:gs>
+          </a:gsLst>
+          <a:lin ang="16200000" scaled="0"/>
+        </a:gradFill>
+      </a:fillStyleLst>
+      <a:lnStyleLst>
+        <a:ln w="9525" cap="flat" cmpd="sng" algn="ctr">
+          <a:solidFill>
+            <a:schemeClr val="phClr">
+              <a:shade val="95000"/>
+              <a:satMod val="105000"/>
+            </a:schemeClr>
+          </a:solidFill>
+          <a:prstDash val="solid"/>
+        </a:ln>
+        <a:ln w="25400" cap="flat" cmpd="sng" algn="ctr">
+          <a:solidFill>
+            <a:schemeClr val="phClr"/>
+          </a:solidFill>
+          <a:prstDash val="solid"/>
+        </a:ln>
+        <a:ln w="38100" cap="flat" cmpd="sng" algn="ctr">
+          <a:solidFill>
+            <a:schemeClr val="phClr"/>
+          </a:solidFill>
+          <a:prstDash val="solid"/>
+        </a:ln>
+      </a:lnStyleLst>
+      <a:effectStyleLst>
+        <a:effectStyle>
+          <a:effectLst>
+            <a:outerShdw blurRad="40000" dist="20000" dir="5400000" rotWithShape="0">
+              <a:srgbClr val="000000">
+                <a:alpha val="38000"/>
+              </a:srgbClr>
+            </a:outerShdw>
+          </a:effectLst>
+        </a:effectStyle>
+        <a:effectStyle>
+          <a:effectLst>
+            <a:outerShdw blurRad="40000" dist="23000" dir="5400000" rotWithShape="0">
+              <a:srgbClr val="000000">
+                <a:alpha val="35000"/>
+              </a:srgbClr>
+            </a:outerShdw>
+          </a:effectLst>
+        </a:effectStyle>
+        <a:effectStyle>
+          <a:effectLst>
+            <a:outerShdw blurRad="40000" dist="23000" dir="5400000" rotWithShape="0">
+              <a:srgbClr val="000000">
+                <a:alpha val="35000"/>
+              </a:srgbClr>
+            </a:outerShdw>
+          </a:effectLst>
+          <a:scene3d>
+            <a:camera prst="orthographicFront">
+              <a:rot lat="0" lon="0" rev="0"/>
+            </a:camera>
+            <a:lightRig rig="threePt" dir="t">
+              <a:rot lat="0" lon="0" rev="1200000"/>
+            </a:lightRig>
+          </a:scene3d>
+          <a:sp3d>
+            <a:bevelT w="63500" h="25400"/>
+          </a:sp3d>
+        </a:effectStyle>
+      </a:effectStyleLst>
+      <a:bgFillStyleLst>
+        <a:solidFill>
+          <a:schemeClr val="phClr"/>
+        </a:solidFill>
+        <a:gradFill rotWithShape="1">
+          <a:gsLst>
+            <a:gs pos="0">
+              <a:schemeClr val="phClr">
+                <a:tint val="40000"/>
+                <a:satMod val="350000"/>
+              </a:schemeClr>
+            </a:gs>
+            <a:gs pos="40000">
+              <a:schemeClr val="phClr">
+                <a:tint val="45000"/>
+                <a:shade val="99000"/>
+                <a:satMod val="350000"/>
+              </a:schemeClr>
+            </a:gs>
+            <a:gs pos="100000">
+              <a:schemeClr val="phClr">
+                <a:shade val="20000"/>
+                <a:satMod val="255000"/>
+              </a:schemeClr>
+            </a:gs>
+          </a:gsLst>
+          <a:path path="circle">
+            <a:fillToRect l="50000" t="-80000" r="50000" b="180000"/>
+          </a:path>
+        </a:gradFill>
+        <a:gradFill rotWithShape="1">
+          <a:gsLst>
+            <a:gs pos="0">
+              <a:schemeClr val="phClr">
+                <a:tint val="80000"/>
+                <a:satMod val="300000"/>
+              </a:schemeClr>
+            </a:gs>
+            <a:gs pos="100000">
+              <a:schemeClr val="phClr">
+                <a:shade val="30000"/>
+                <a:satMod val="200000"/>
+              </a:schemeClr>
+            </a:gs>
+          </a:gsLst>
+          <a:path path="circle">
+            <a:fillToRect l="50000" t="50000" r="50000" b="50000"/>
+          </a:path>
+        </a:gradFill>
+      </a:bgFillStyleLst>
+    </a:fmtScheme>
+  </a:themeElements>
+  <a:objectDefaults>
+    <a:spDef>
+      <a:spPr/>
+      <a:bodyPr/>
+      <a:lstStyle/>
+      <a:style>
+        <a:lnRef idx="1">
+          <a:schemeClr val="accent1"/>
+        </a:lnRef>
+        <a:fillRef idx="3">
+          <a:schemeClr val="accent1"/>
+        </a:fillRef>
+        <a:effectRef idx="2">
+          <a:schemeClr val="accent1"/>
+        </a:effectRef>
+        <a:fontRef idx="minor">
+          <a:schemeClr val="lt1"/>
+        </a:fontRef>
+      </a:style>
+    </a:spDef>
+    <a:lnDef>
+      <a:spPr/>
+      <a:bodyPr/>
+      <a:lstStyle/>
+      <a:style>
+        <a:lnRef idx="2">
+          <a:schemeClr val="accent1"/>
+        </a:lnRef>
+        <a:fillRef idx="0">
+          <a:schemeClr val="accent1"/>
+        </a:fillRef>
+        <a:effectRef idx="1">
+          <a:schemeClr val="accent1"/>
+        </a:effectRef>
+        <a:fontRef idx="minor">
+          <a:schemeClr val="tx1"/>
+        </a:fontRef>
+      </a:style>
+    </a:lnDef>
+  </a:objectDefaults>
+  <a:extraClrSchemeLst/>
+</a:theme>
 </file>
</xml_diff>